<commit_message>
:pencil2: Additions to Presentation
</commit_message>
<xml_diff>
--- a/Contributing-to-Django.pptx
+++ b/Contributing-to-Django.pptx
@@ -5,7 +5,7 @@
     <p:sldMasterId id="2147483648" r:id="rId1"/>
   </p:sldMasterIdLst>
   <p:notesMasterIdLst>
-    <p:notesMasterId r:id="rId14"/>
+    <p:notesMasterId r:id="rId35"/>
   </p:notesMasterIdLst>
   <p:sldIdLst>
     <p:sldId id="256" r:id="rId2"/>
@@ -18,8 +18,29 @@
     <p:sldId id="263" r:id="rId9"/>
     <p:sldId id="265" r:id="rId10"/>
     <p:sldId id="266" r:id="rId11"/>
-    <p:sldId id="268" r:id="rId12"/>
-    <p:sldId id="267" r:id="rId13"/>
+    <p:sldId id="267" r:id="rId12"/>
+    <p:sldId id="269" r:id="rId13"/>
+    <p:sldId id="270" r:id="rId14"/>
+    <p:sldId id="271" r:id="rId15"/>
+    <p:sldId id="273" r:id="rId16"/>
+    <p:sldId id="272" r:id="rId17"/>
+    <p:sldId id="268" r:id="rId18"/>
+    <p:sldId id="274" r:id="rId19"/>
+    <p:sldId id="275" r:id="rId20"/>
+    <p:sldId id="276" r:id="rId21"/>
+    <p:sldId id="277" r:id="rId22"/>
+    <p:sldId id="278" r:id="rId23"/>
+    <p:sldId id="279" r:id="rId24"/>
+    <p:sldId id="280" r:id="rId25"/>
+    <p:sldId id="281" r:id="rId26"/>
+    <p:sldId id="282" r:id="rId27"/>
+    <p:sldId id="283" r:id="rId28"/>
+    <p:sldId id="284" r:id="rId29"/>
+    <p:sldId id="285" r:id="rId30"/>
+    <p:sldId id="286" r:id="rId31"/>
+    <p:sldId id="288" r:id="rId32"/>
+    <p:sldId id="289" r:id="rId33"/>
+    <p:sldId id="287" r:id="rId34"/>
   </p:sldIdLst>
   <p:sldSz cx="12192000" cy="6858000"/>
   <p:notesSz cx="6858000" cy="9144000"/>
@@ -118,6 +139,11 @@
       </a:defRPr>
     </a:lvl9pPr>
   </p:defaultTextStyle>
+  <p:extLst>
+    <p:ext uri="{EFAFB233-063F-42B5-8137-9DF3F51BA10A}">
+      <p15:sldGuideLst xmlns:p15="http://schemas.microsoft.com/office/powerpoint/2012/main"/>
+    </p:ext>
+  </p:extLst>
 </p:presentation>
 </file>
 
@@ -203,7 +229,7 @@
           <a:p>
             <a:fld id="{D81BE35A-6853-884F-B056-9F44A3663F3A}" type="datetimeFigureOut">
               <a:rPr lang="en-US" smtClean="0"/>
-              <a:t>7/27/23</a:t>
+              <a:t>7/29/23</a:t>
             </a:fld>
             <a:endParaRPr lang="en-US"/>
           </a:p>
@@ -591,7 +617,27 @@
                 <a:effectLst/>
                 <a:latin typeface="Inconsolata NF Regular" pitchFamily="49" charset="77"/>
               </a:rPr>
-              <a:t>I was only 3 miles from the summit ... but I wasn't sure I could go any further.</a:t>
+              <a:t>I was only 3 miles from the summit of Mt </a:t>
+            </a:r>
+            <a:r>
+              <a:rPr lang="en-US" b="0" dirty="0" err="1">
+                <a:solidFill>
+                  <a:srgbClr val="CCCCCC"/>
+                </a:solidFill>
+                <a:effectLst/>
+                <a:latin typeface="Inconsolata NF Regular" pitchFamily="49" charset="77"/>
+              </a:rPr>
+              <a:t>Whiteney</a:t>
+            </a:r>
+            <a:r>
+              <a:rPr lang="en-US" b="0" dirty="0">
+                <a:solidFill>
+                  <a:srgbClr val="CCCCCC"/>
+                </a:solidFill>
+                <a:effectLst/>
+                <a:latin typeface="Inconsolata NF Regular" pitchFamily="49" charset="77"/>
+              </a:rPr>
+              <a:t> ... but I wasn't sure I could go any further.</a:t>
             </a:r>
           </a:p>
           <a:p>
@@ -748,16 +794,7 @@
           <a:bodyPr/>
           <a:lstStyle/>
           <a:p>
-            <a:r>
-              <a:rPr lang="en-US" b="0" dirty="0">
-                <a:solidFill>
-                  <a:srgbClr val="CCCCCC"/>
-                </a:solidFill>
-                <a:effectLst/>
-                <a:latin typeface="Inconsolata NF Regular" pitchFamily="49" charset="77"/>
-              </a:rPr>
-              <a:t>Finding a ticket and picking to work it: 10070</a:t>
-            </a:r>
+            <a:endParaRPr lang="en-US" dirty="0"/>
           </a:p>
         </p:txBody>
       </p:sp>
@@ -787,7 +824,1067 @@
     </p:spTree>
     <p:extLst>
       <p:ext uri="{BB962C8B-B14F-4D97-AF65-F5344CB8AC3E}">
-        <p14:creationId xmlns:p14="http://schemas.microsoft.com/office/powerpoint/2010/main" val="2003444413"/>
+        <p14:creationId xmlns:p14="http://schemas.microsoft.com/office/powerpoint/2010/main" val="210441552"/>
+      </p:ext>
+    </p:extLst>
+  </p:cSld>
+  <p:clrMapOvr>
+    <a:masterClrMapping/>
+  </p:clrMapOvr>
+</p:notes>
+</file>
+
+<file path=ppt/notesSlides/notesSlide11.xml><?xml version="1.0" encoding="utf-8"?>
+<p:notes xmlns:a="http://schemas.openxmlformats.org/drawingml/2006/main" xmlns:r="http://schemas.openxmlformats.org/officeDocument/2006/relationships" xmlns:p="http://schemas.openxmlformats.org/presentationml/2006/main">
+  <p:cSld>
+    <p:spTree>
+      <p:nvGrpSpPr>
+        <p:cNvPr id="1" name=""/>
+        <p:cNvGrpSpPr/>
+        <p:nvPr/>
+      </p:nvGrpSpPr>
+      <p:grpSpPr>
+        <a:xfrm>
+          <a:off x="0" y="0"/>
+          <a:ext cx="0" cy="0"/>
+          <a:chOff x="0" y="0"/>
+          <a:chExt cx="0" cy="0"/>
+        </a:xfrm>
+      </p:grpSpPr>
+      <p:sp>
+        <p:nvSpPr>
+          <p:cNvPr id="2" name="Slide Image Placeholder 1"/>
+          <p:cNvSpPr>
+            <a:spLocks noGrp="1" noRot="1" noChangeAspect="1"/>
+          </p:cNvSpPr>
+          <p:nvPr>
+            <p:ph type="sldImg"/>
+          </p:nvPr>
+        </p:nvSpPr>
+        <p:spPr/>
+      </p:sp>
+      <p:sp>
+        <p:nvSpPr>
+          <p:cNvPr id="3" name="Notes Placeholder 2"/>
+          <p:cNvSpPr>
+            <a:spLocks noGrp="1"/>
+          </p:cNvSpPr>
+          <p:nvPr>
+            <p:ph type="body" idx="1"/>
+          </p:nvPr>
+        </p:nvSpPr>
+        <p:spPr/>
+        <p:txBody>
+          <a:bodyPr/>
+          <a:lstStyle/>
+          <a:p>
+            <a:r>
+              <a:rPr lang="en-US" b="0" dirty="0">
+                <a:solidFill>
+                  <a:srgbClr val="CCCCCC"/>
+                </a:solidFill>
+                <a:effectLst/>
+                <a:latin typeface="Inconsolata NF Regular" pitchFamily="49" charset="77"/>
+              </a:rPr>
+              <a:t>I spent time reviewing the ticket and then speaking with Simon Charette about it. We agreed that it actually didn’t seem to be a problem anymore!</a:t>
+            </a:r>
+          </a:p>
+        </p:txBody>
+      </p:sp>
+      <p:sp>
+        <p:nvSpPr>
+          <p:cNvPr id="4" name="Slide Number Placeholder 3"/>
+          <p:cNvSpPr>
+            <a:spLocks noGrp="1"/>
+          </p:cNvSpPr>
+          <p:nvPr>
+            <p:ph type="sldNum" sz="quarter" idx="5"/>
+          </p:nvPr>
+        </p:nvSpPr>
+        <p:spPr/>
+        <p:txBody>
+          <a:bodyPr/>
+          <a:lstStyle/>
+          <a:p>
+            <a:fld id="{5B105CD6-096C-EA40-9B31-0FFB08AC29C0}" type="slidenum">
+              <a:rPr lang="en-US" smtClean="0"/>
+              <a:t>12</a:t>
+            </a:fld>
+            <a:endParaRPr lang="en-US"/>
+          </a:p>
+        </p:txBody>
+      </p:sp>
+    </p:spTree>
+    <p:extLst>
+      <p:ext uri="{BB962C8B-B14F-4D97-AF65-F5344CB8AC3E}">
+        <p14:creationId xmlns:p14="http://schemas.microsoft.com/office/powerpoint/2010/main" val="1746405584"/>
+      </p:ext>
+    </p:extLst>
+  </p:cSld>
+  <p:clrMapOvr>
+    <a:masterClrMapping/>
+  </p:clrMapOvr>
+</p:notes>
+</file>
+
+<file path=ppt/notesSlides/notesSlide12.xml><?xml version="1.0" encoding="utf-8"?>
+<p:notes xmlns:a="http://schemas.openxmlformats.org/drawingml/2006/main" xmlns:r="http://schemas.openxmlformats.org/officeDocument/2006/relationships" xmlns:p="http://schemas.openxmlformats.org/presentationml/2006/main">
+  <p:cSld>
+    <p:spTree>
+      <p:nvGrpSpPr>
+        <p:cNvPr id="1" name=""/>
+        <p:cNvGrpSpPr/>
+        <p:nvPr/>
+      </p:nvGrpSpPr>
+      <p:grpSpPr>
+        <a:xfrm>
+          <a:off x="0" y="0"/>
+          <a:ext cx="0" cy="0"/>
+          <a:chOff x="0" y="0"/>
+          <a:chExt cx="0" cy="0"/>
+        </a:xfrm>
+      </p:grpSpPr>
+      <p:sp>
+        <p:nvSpPr>
+          <p:cNvPr id="2" name="Slide Image Placeholder 1"/>
+          <p:cNvSpPr>
+            <a:spLocks noGrp="1" noRot="1" noChangeAspect="1"/>
+          </p:cNvSpPr>
+          <p:nvPr>
+            <p:ph type="sldImg"/>
+          </p:nvPr>
+        </p:nvSpPr>
+        <p:spPr/>
+      </p:sp>
+      <p:sp>
+        <p:nvSpPr>
+          <p:cNvPr id="3" name="Notes Placeholder 2"/>
+          <p:cNvSpPr>
+            <a:spLocks noGrp="1"/>
+          </p:cNvSpPr>
+          <p:nvPr>
+            <p:ph type="body" idx="1"/>
+          </p:nvPr>
+        </p:nvSpPr>
+        <p:spPr/>
+        <p:txBody>
+          <a:bodyPr/>
+          <a:lstStyle/>
+          <a:p>
+            <a:r>
+              <a:rPr lang="en-US" b="0" dirty="0">
+                <a:solidFill>
+                  <a:srgbClr val="569CD6"/>
+                </a:solidFill>
+                <a:effectLst/>
+                <a:latin typeface="Inconsolata NF Regular" pitchFamily="49" charset="77"/>
+              </a:rPr>
+              <a:t>Marking the Ticket as Done!</a:t>
+            </a:r>
+            <a:endParaRPr lang="en-US" b="0" dirty="0">
+              <a:solidFill>
+                <a:srgbClr val="CCCCCC"/>
+              </a:solidFill>
+              <a:effectLst/>
+              <a:latin typeface="Inconsolata NF Regular" pitchFamily="49" charset="77"/>
+            </a:endParaRPr>
+          </a:p>
+        </p:txBody>
+      </p:sp>
+      <p:sp>
+        <p:nvSpPr>
+          <p:cNvPr id="4" name="Slide Number Placeholder 3"/>
+          <p:cNvSpPr>
+            <a:spLocks noGrp="1"/>
+          </p:cNvSpPr>
+          <p:nvPr>
+            <p:ph type="sldNum" sz="quarter" idx="5"/>
+          </p:nvPr>
+        </p:nvSpPr>
+        <p:spPr/>
+        <p:txBody>
+          <a:bodyPr/>
+          <a:lstStyle/>
+          <a:p>
+            <a:fld id="{5B105CD6-096C-EA40-9B31-0FFB08AC29C0}" type="slidenum">
+              <a:rPr lang="en-US" smtClean="0"/>
+              <a:t>13</a:t>
+            </a:fld>
+            <a:endParaRPr lang="en-US"/>
+          </a:p>
+        </p:txBody>
+      </p:sp>
+    </p:spTree>
+    <p:extLst>
+      <p:ext uri="{BB962C8B-B14F-4D97-AF65-F5344CB8AC3E}">
+        <p14:creationId xmlns:p14="http://schemas.microsoft.com/office/powerpoint/2010/main" val="661108254"/>
+      </p:ext>
+    </p:extLst>
+  </p:cSld>
+  <p:clrMapOvr>
+    <a:masterClrMapping/>
+  </p:clrMapOvr>
+</p:notes>
+</file>
+
+<file path=ppt/notesSlides/notesSlide13.xml><?xml version="1.0" encoding="utf-8"?>
+<p:notes xmlns:a="http://schemas.openxmlformats.org/drawingml/2006/main" xmlns:r="http://schemas.openxmlformats.org/officeDocument/2006/relationships" xmlns:p="http://schemas.openxmlformats.org/presentationml/2006/main">
+  <p:cSld>
+    <p:spTree>
+      <p:nvGrpSpPr>
+        <p:cNvPr id="1" name=""/>
+        <p:cNvGrpSpPr/>
+        <p:nvPr/>
+      </p:nvGrpSpPr>
+      <p:grpSpPr>
+        <a:xfrm>
+          <a:off x="0" y="0"/>
+          <a:ext cx="0" cy="0"/>
+          <a:chOff x="0" y="0"/>
+          <a:chExt cx="0" cy="0"/>
+        </a:xfrm>
+      </p:grpSpPr>
+      <p:sp>
+        <p:nvSpPr>
+          <p:cNvPr id="2" name="Slide Image Placeholder 1"/>
+          <p:cNvSpPr>
+            <a:spLocks noGrp="1" noRot="1" noChangeAspect="1"/>
+          </p:cNvSpPr>
+          <p:nvPr>
+            <p:ph type="sldImg"/>
+          </p:nvPr>
+        </p:nvSpPr>
+        <p:spPr/>
+      </p:sp>
+      <p:sp>
+        <p:nvSpPr>
+          <p:cNvPr id="3" name="Notes Placeholder 2"/>
+          <p:cNvSpPr>
+            <a:spLocks noGrp="1"/>
+          </p:cNvSpPr>
+          <p:nvPr>
+            <p:ph type="body" idx="1"/>
+          </p:nvPr>
+        </p:nvSpPr>
+        <p:spPr/>
+        <p:txBody>
+          <a:bodyPr/>
+          <a:lstStyle/>
+          <a:p>
+            <a:r>
+              <a:rPr lang="en-US" b="0" dirty="0">
+                <a:solidFill>
+                  <a:srgbClr val="CCCCCC"/>
+                </a:solidFill>
+                <a:effectLst/>
+                <a:latin typeface="Inconsolata NF Regular" pitchFamily="49" charset="77"/>
+              </a:rPr>
+              <a:t>I was so excited that I let the world know about it on the bird site</a:t>
+            </a:r>
+          </a:p>
+        </p:txBody>
+      </p:sp>
+      <p:sp>
+        <p:nvSpPr>
+          <p:cNvPr id="4" name="Slide Number Placeholder 3"/>
+          <p:cNvSpPr>
+            <a:spLocks noGrp="1"/>
+          </p:cNvSpPr>
+          <p:nvPr>
+            <p:ph type="sldNum" sz="quarter" idx="5"/>
+          </p:nvPr>
+        </p:nvSpPr>
+        <p:spPr/>
+        <p:txBody>
+          <a:bodyPr/>
+          <a:lstStyle/>
+          <a:p>
+            <a:fld id="{5B105CD6-096C-EA40-9B31-0FFB08AC29C0}" type="slidenum">
+              <a:rPr lang="en-US" smtClean="0"/>
+              <a:t>14</a:t>
+            </a:fld>
+            <a:endParaRPr lang="en-US"/>
+          </a:p>
+        </p:txBody>
+      </p:sp>
+    </p:spTree>
+    <p:extLst>
+      <p:ext uri="{BB962C8B-B14F-4D97-AF65-F5344CB8AC3E}">
+        <p14:creationId xmlns:p14="http://schemas.microsoft.com/office/powerpoint/2010/main" val="2664461905"/>
+      </p:ext>
+    </p:extLst>
+  </p:cSld>
+  <p:clrMapOvr>
+    <a:masterClrMapping/>
+  </p:clrMapOvr>
+</p:notes>
+</file>
+
+<file path=ppt/notesSlides/notesSlide14.xml><?xml version="1.0" encoding="utf-8"?>
+<p:notes xmlns:a="http://schemas.openxmlformats.org/drawingml/2006/main" xmlns:r="http://schemas.openxmlformats.org/officeDocument/2006/relationships" xmlns:p="http://schemas.openxmlformats.org/presentationml/2006/main">
+  <p:cSld>
+    <p:spTree>
+      <p:nvGrpSpPr>
+        <p:cNvPr id="1" name=""/>
+        <p:cNvGrpSpPr/>
+        <p:nvPr/>
+      </p:nvGrpSpPr>
+      <p:grpSpPr>
+        <a:xfrm>
+          <a:off x="0" y="0"/>
+          <a:ext cx="0" cy="0"/>
+          <a:chOff x="0" y="0"/>
+          <a:chExt cx="0" cy="0"/>
+        </a:xfrm>
+      </p:grpSpPr>
+      <p:sp>
+        <p:nvSpPr>
+          <p:cNvPr id="2" name="Slide Image Placeholder 1"/>
+          <p:cNvSpPr>
+            <a:spLocks noGrp="1" noRot="1" noChangeAspect="1"/>
+          </p:cNvSpPr>
+          <p:nvPr>
+            <p:ph type="sldImg"/>
+          </p:nvPr>
+        </p:nvSpPr>
+        <p:spPr/>
+      </p:sp>
+      <p:sp>
+        <p:nvSpPr>
+          <p:cNvPr id="3" name="Notes Placeholder 2"/>
+          <p:cNvSpPr>
+            <a:spLocks noGrp="1"/>
+          </p:cNvSpPr>
+          <p:nvPr>
+            <p:ph type="body" idx="1"/>
+          </p:nvPr>
+        </p:nvSpPr>
+        <p:spPr/>
+        <p:txBody>
+          <a:bodyPr/>
+          <a:lstStyle/>
+          <a:p>
+            <a:r>
+              <a:rPr lang="en-US" b="0" dirty="0">
+                <a:solidFill>
+                  <a:srgbClr val="CCCCCC"/>
+                </a:solidFill>
+                <a:effectLst/>
+                <a:latin typeface="Inconsolata NF Regular" pitchFamily="49" charset="77"/>
+              </a:rPr>
+              <a:t>And then I headed home having ‘fixed’ a bug in the ORM </a:t>
+            </a:r>
+          </a:p>
+          <a:p>
+            <a:endParaRPr lang="en-US" b="0" dirty="0">
+              <a:solidFill>
+                <a:srgbClr val="CCCCCC"/>
+              </a:solidFill>
+              <a:effectLst/>
+              <a:latin typeface="Inconsolata NF Regular" pitchFamily="49" charset="77"/>
+            </a:endParaRPr>
+          </a:p>
+          <a:p>
+            <a:r>
+              <a:rPr lang="en-US" b="0" dirty="0">
+                <a:solidFill>
+                  <a:srgbClr val="CCCCCC"/>
+                </a:solidFill>
+                <a:effectLst/>
+                <a:latin typeface="Inconsolata NF Regular" pitchFamily="49" charset="77"/>
+              </a:rPr>
+              <a:t>….</a:t>
+            </a:r>
+          </a:p>
+          <a:p>
+            <a:endParaRPr lang="en-US" b="0" dirty="0">
+              <a:solidFill>
+                <a:srgbClr val="CCCCCC"/>
+              </a:solidFill>
+              <a:effectLst/>
+              <a:latin typeface="Inconsolata NF Regular" pitchFamily="49" charset="77"/>
+            </a:endParaRPr>
+          </a:p>
+          <a:p>
+            <a:r>
+              <a:rPr lang="en-US" b="0" dirty="0">
+                <a:solidFill>
+                  <a:srgbClr val="CCCCCC"/>
+                </a:solidFill>
+                <a:effectLst/>
+                <a:latin typeface="Inconsolata NF Regular" pitchFamily="49" charset="77"/>
+              </a:rPr>
+              <a:t>And I felt *really* good about this</a:t>
+            </a:r>
+          </a:p>
+        </p:txBody>
+      </p:sp>
+      <p:sp>
+        <p:nvSpPr>
+          <p:cNvPr id="4" name="Slide Number Placeholder 3"/>
+          <p:cNvSpPr>
+            <a:spLocks noGrp="1"/>
+          </p:cNvSpPr>
+          <p:nvPr>
+            <p:ph type="sldNum" sz="quarter" idx="5"/>
+          </p:nvPr>
+        </p:nvSpPr>
+        <p:spPr/>
+        <p:txBody>
+          <a:bodyPr/>
+          <a:lstStyle/>
+          <a:p>
+            <a:fld id="{5B105CD6-096C-EA40-9B31-0FFB08AC29C0}" type="slidenum">
+              <a:rPr lang="en-US" smtClean="0"/>
+              <a:t>15</a:t>
+            </a:fld>
+            <a:endParaRPr lang="en-US"/>
+          </a:p>
+        </p:txBody>
+      </p:sp>
+    </p:spTree>
+    <p:extLst>
+      <p:ext uri="{BB962C8B-B14F-4D97-AF65-F5344CB8AC3E}">
+        <p14:creationId xmlns:p14="http://schemas.microsoft.com/office/powerpoint/2010/main" val="929216173"/>
+      </p:ext>
+    </p:extLst>
+  </p:cSld>
+  <p:clrMapOvr>
+    <a:masterClrMapping/>
+  </p:clrMapOvr>
+</p:notes>
+</file>
+
+<file path=ppt/notesSlides/notesSlide15.xml><?xml version="1.0" encoding="utf-8"?>
+<p:notes xmlns:a="http://schemas.openxmlformats.org/drawingml/2006/main" xmlns:r="http://schemas.openxmlformats.org/officeDocument/2006/relationships" xmlns:p="http://schemas.openxmlformats.org/presentationml/2006/main">
+  <p:cSld>
+    <p:spTree>
+      <p:nvGrpSpPr>
+        <p:cNvPr id="1" name=""/>
+        <p:cNvGrpSpPr/>
+        <p:nvPr/>
+      </p:nvGrpSpPr>
+      <p:grpSpPr>
+        <a:xfrm>
+          <a:off x="0" y="0"/>
+          <a:ext cx="0" cy="0"/>
+          <a:chOff x="0" y="0"/>
+          <a:chExt cx="0" cy="0"/>
+        </a:xfrm>
+      </p:grpSpPr>
+      <p:sp>
+        <p:nvSpPr>
+          <p:cNvPr id="2" name="Slide Image Placeholder 1"/>
+          <p:cNvSpPr>
+            <a:spLocks noGrp="1" noRot="1" noChangeAspect="1"/>
+          </p:cNvSpPr>
+          <p:nvPr>
+            <p:ph type="sldImg"/>
+          </p:nvPr>
+        </p:nvSpPr>
+        <p:spPr/>
+      </p:sp>
+      <p:sp>
+        <p:nvSpPr>
+          <p:cNvPr id="3" name="Notes Placeholder 2"/>
+          <p:cNvSpPr>
+            <a:spLocks noGrp="1"/>
+          </p:cNvSpPr>
+          <p:nvPr>
+            <p:ph type="body" idx="1"/>
+          </p:nvPr>
+        </p:nvSpPr>
+        <p:spPr/>
+        <p:txBody>
+          <a:bodyPr/>
+          <a:lstStyle/>
+          <a:p>
+            <a:endParaRPr lang="en-US" b="0" dirty="0">
+              <a:solidFill>
+                <a:srgbClr val="CCCCCC"/>
+              </a:solidFill>
+              <a:effectLst/>
+              <a:latin typeface="Inconsolata NF Regular" pitchFamily="49" charset="77"/>
+            </a:endParaRPr>
+          </a:p>
+        </p:txBody>
+      </p:sp>
+      <p:sp>
+        <p:nvSpPr>
+          <p:cNvPr id="4" name="Slide Number Placeholder 3"/>
+          <p:cNvSpPr>
+            <a:spLocks noGrp="1"/>
+          </p:cNvSpPr>
+          <p:nvPr>
+            <p:ph type="sldNum" sz="quarter" idx="5"/>
+          </p:nvPr>
+        </p:nvSpPr>
+        <p:spPr/>
+        <p:txBody>
+          <a:bodyPr/>
+          <a:lstStyle/>
+          <a:p>
+            <a:fld id="{5B105CD6-096C-EA40-9B31-0FFB08AC29C0}" type="slidenum">
+              <a:rPr lang="en-US" smtClean="0"/>
+              <a:t>16</a:t>
+            </a:fld>
+            <a:endParaRPr lang="en-US"/>
+          </a:p>
+        </p:txBody>
+      </p:sp>
+    </p:spTree>
+    <p:extLst>
+      <p:ext uri="{BB962C8B-B14F-4D97-AF65-F5344CB8AC3E}">
+        <p14:creationId xmlns:p14="http://schemas.microsoft.com/office/powerpoint/2010/main" val="1525648821"/>
+      </p:ext>
+    </p:extLst>
+  </p:cSld>
+  <p:clrMapOvr>
+    <a:masterClrMapping/>
+  </p:clrMapOvr>
+</p:notes>
+</file>
+
+<file path=ppt/notesSlides/notesSlide16.xml><?xml version="1.0" encoding="utf-8"?>
+<p:notes xmlns:a="http://schemas.openxmlformats.org/drawingml/2006/main" xmlns:r="http://schemas.openxmlformats.org/officeDocument/2006/relationships" xmlns:p="http://schemas.openxmlformats.org/presentationml/2006/main">
+  <p:cSld>
+    <p:spTree>
+      <p:nvGrpSpPr>
+        <p:cNvPr id="1" name=""/>
+        <p:cNvGrpSpPr/>
+        <p:nvPr/>
+      </p:nvGrpSpPr>
+      <p:grpSpPr>
+        <a:xfrm>
+          <a:off x="0" y="0"/>
+          <a:ext cx="0" cy="0"/>
+          <a:chOff x="0" y="0"/>
+          <a:chExt cx="0" cy="0"/>
+        </a:xfrm>
+      </p:grpSpPr>
+      <p:sp>
+        <p:nvSpPr>
+          <p:cNvPr id="2" name="Slide Image Placeholder 1"/>
+          <p:cNvSpPr>
+            <a:spLocks noGrp="1" noRot="1" noChangeAspect="1"/>
+          </p:cNvSpPr>
+          <p:nvPr>
+            <p:ph type="sldImg"/>
+          </p:nvPr>
+        </p:nvSpPr>
+        <p:spPr/>
+      </p:sp>
+      <p:sp>
+        <p:nvSpPr>
+          <p:cNvPr id="3" name="Notes Placeholder 2"/>
+          <p:cNvSpPr>
+            <a:spLocks noGrp="1"/>
+          </p:cNvSpPr>
+          <p:nvPr>
+            <p:ph type="body" idx="1"/>
+          </p:nvPr>
+        </p:nvSpPr>
+        <p:spPr/>
+        <p:txBody>
+          <a:bodyPr/>
+          <a:lstStyle/>
+          <a:p>
+            <a:r>
+              <a:rPr lang="en-US" b="0" dirty="0">
+                <a:solidFill>
+                  <a:srgbClr val="CCCCCC"/>
+                </a:solidFill>
+                <a:effectLst/>
+                <a:latin typeface="Inconsolata NF Regular" pitchFamily="49" charset="77"/>
+              </a:rPr>
+              <a:t>I was faced with two potential choices:</a:t>
+            </a:r>
+          </a:p>
+          <a:p>
+            <a:endParaRPr lang="en-US" b="0" dirty="0">
+              <a:solidFill>
+                <a:srgbClr val="CCCCCC"/>
+              </a:solidFill>
+              <a:effectLst/>
+              <a:latin typeface="Inconsolata NF Regular" pitchFamily="49" charset="77"/>
+            </a:endParaRPr>
+          </a:p>
+          <a:p>
+            <a:pPr marL="228600" indent="-228600">
+              <a:buAutoNum type="arabicPeriod"/>
+            </a:pPr>
+            <a:r>
+              <a:rPr lang="en-US" b="0" dirty="0">
+                <a:solidFill>
+                  <a:srgbClr val="CCCCCC"/>
+                </a:solidFill>
+                <a:effectLst/>
+                <a:latin typeface="Inconsolata NF Regular" pitchFamily="49" charset="77"/>
+              </a:rPr>
+              <a:t>Ignore the bug. It had been a bug for YEARS and hadn’t really caused any MAJOR issues</a:t>
+            </a:r>
+          </a:p>
+          <a:p>
+            <a:pPr marL="228600" indent="-228600">
+              <a:buAutoNum type="arabicPeriod"/>
+            </a:pPr>
+            <a:r>
+              <a:rPr lang="en-US" b="0" dirty="0">
+                <a:solidFill>
+                  <a:srgbClr val="CCCCCC"/>
+                </a:solidFill>
+                <a:effectLst/>
+                <a:latin typeface="Inconsolata NF Regular" pitchFamily="49" charset="77"/>
+              </a:rPr>
+              <a:t>Try to work it on my own</a:t>
+            </a:r>
+          </a:p>
+          <a:p>
+            <a:pPr marL="228600" indent="-228600">
+              <a:buAutoNum type="arabicPeriod"/>
+            </a:pPr>
+            <a:endParaRPr lang="en-US" b="0" dirty="0">
+              <a:solidFill>
+                <a:srgbClr val="CCCCCC"/>
+              </a:solidFill>
+              <a:effectLst/>
+              <a:latin typeface="Inconsolata NF Regular" pitchFamily="49" charset="77"/>
+            </a:endParaRPr>
+          </a:p>
+          <a:p>
+            <a:pPr marL="0" indent="0">
+              <a:buFontTx/>
+              <a:buNone/>
+            </a:pPr>
+            <a:r>
+              <a:rPr lang="en-US" b="0" dirty="0">
+                <a:solidFill>
+                  <a:srgbClr val="CCCCCC"/>
+                </a:solidFill>
+                <a:effectLst/>
+                <a:latin typeface="Inconsolata NF Regular" pitchFamily="49" charset="77"/>
+              </a:rPr>
+              <a:t>I also had lots of feelings surrounding the discovery of the bug still existing</a:t>
+            </a:r>
+          </a:p>
+        </p:txBody>
+      </p:sp>
+      <p:sp>
+        <p:nvSpPr>
+          <p:cNvPr id="4" name="Slide Number Placeholder 3"/>
+          <p:cNvSpPr>
+            <a:spLocks noGrp="1"/>
+          </p:cNvSpPr>
+          <p:nvPr>
+            <p:ph type="sldNum" sz="quarter" idx="5"/>
+          </p:nvPr>
+        </p:nvSpPr>
+        <p:spPr/>
+        <p:txBody>
+          <a:bodyPr/>
+          <a:lstStyle/>
+          <a:p>
+            <a:fld id="{5B105CD6-096C-EA40-9B31-0FFB08AC29C0}" type="slidenum">
+              <a:rPr lang="en-US" smtClean="0"/>
+              <a:t>18</a:t>
+            </a:fld>
+            <a:endParaRPr lang="en-US"/>
+          </a:p>
+        </p:txBody>
+      </p:sp>
+    </p:spTree>
+    <p:extLst>
+      <p:ext uri="{BB962C8B-B14F-4D97-AF65-F5344CB8AC3E}">
+        <p14:creationId xmlns:p14="http://schemas.microsoft.com/office/powerpoint/2010/main" val="1049416907"/>
+      </p:ext>
+    </p:extLst>
+  </p:cSld>
+  <p:clrMapOvr>
+    <a:masterClrMapping/>
+  </p:clrMapOvr>
+</p:notes>
+</file>
+
+<file path=ppt/notesSlides/notesSlide17.xml><?xml version="1.0" encoding="utf-8"?>
+<p:notes xmlns:a="http://schemas.openxmlformats.org/drawingml/2006/main" xmlns:r="http://schemas.openxmlformats.org/officeDocument/2006/relationships" xmlns:p="http://schemas.openxmlformats.org/presentationml/2006/main">
+  <p:cSld>
+    <p:spTree>
+      <p:nvGrpSpPr>
+        <p:cNvPr id="1" name=""/>
+        <p:cNvGrpSpPr/>
+        <p:nvPr/>
+      </p:nvGrpSpPr>
+      <p:grpSpPr>
+        <a:xfrm>
+          <a:off x="0" y="0"/>
+          <a:ext cx="0" cy="0"/>
+          <a:chOff x="0" y="0"/>
+          <a:chExt cx="0" cy="0"/>
+        </a:xfrm>
+      </p:grpSpPr>
+      <p:sp>
+        <p:nvSpPr>
+          <p:cNvPr id="2" name="Slide Image Placeholder 1"/>
+          <p:cNvSpPr>
+            <a:spLocks noGrp="1" noRot="1" noChangeAspect="1"/>
+          </p:cNvSpPr>
+          <p:nvPr>
+            <p:ph type="sldImg"/>
+          </p:nvPr>
+        </p:nvSpPr>
+        <p:spPr/>
+      </p:sp>
+      <p:sp>
+        <p:nvSpPr>
+          <p:cNvPr id="3" name="Notes Placeholder 2"/>
+          <p:cNvSpPr>
+            <a:spLocks noGrp="1"/>
+          </p:cNvSpPr>
+          <p:nvPr>
+            <p:ph type="body" idx="1"/>
+          </p:nvPr>
+        </p:nvSpPr>
+        <p:spPr/>
+        <p:txBody>
+          <a:bodyPr/>
+          <a:lstStyle/>
+          <a:p>
+            <a:r>
+              <a:rPr lang="en-US" b="0" dirty="0">
+                <a:solidFill>
+                  <a:srgbClr val="CCCCCC"/>
+                </a:solidFill>
+                <a:effectLst/>
+                <a:latin typeface="Inconsolata NF Regular" pitchFamily="49" charset="77"/>
+              </a:rPr>
+              <a:t>I tweeted out it</a:t>
+            </a:r>
+          </a:p>
+          <a:p>
+            <a:endParaRPr lang="en-US" b="0" dirty="0">
+              <a:solidFill>
+                <a:srgbClr val="CCCCCC"/>
+              </a:solidFill>
+              <a:effectLst/>
+              <a:latin typeface="Inconsolata NF Regular" pitchFamily="49" charset="77"/>
+            </a:endParaRPr>
+          </a:p>
+          <a:p>
+            <a:r>
+              <a:rPr lang="en-US" b="0" dirty="0">
+                <a:solidFill>
+                  <a:srgbClr val="CCCCCC"/>
+                </a:solidFill>
+                <a:effectLst/>
+                <a:latin typeface="Inconsolata NF Regular" pitchFamily="49" charset="77"/>
+              </a:rPr>
+              <a:t>I had people at </a:t>
+            </a:r>
+            <a:r>
+              <a:rPr lang="en-US" b="0" dirty="0" err="1">
+                <a:solidFill>
+                  <a:srgbClr val="CCCCCC"/>
+                </a:solidFill>
+                <a:effectLst/>
+                <a:latin typeface="Inconsolata NF Regular" pitchFamily="49" charset="77"/>
+              </a:rPr>
+              <a:t>DjangoCon</a:t>
+            </a:r>
+            <a:r>
+              <a:rPr lang="en-US" b="0" dirty="0">
+                <a:solidFill>
+                  <a:srgbClr val="CCCCCC"/>
+                </a:solidFill>
+                <a:effectLst/>
+                <a:latin typeface="Inconsolata NF Regular" pitchFamily="49" charset="77"/>
+              </a:rPr>
+              <a:t> US 2022 ASK ME HOW I DID IT!</a:t>
+            </a:r>
+          </a:p>
+          <a:p>
+            <a:endParaRPr lang="en-US" b="0" dirty="0">
+              <a:solidFill>
+                <a:srgbClr val="CCCCCC"/>
+              </a:solidFill>
+              <a:effectLst/>
+              <a:latin typeface="Inconsolata NF Regular" pitchFamily="49" charset="77"/>
+            </a:endParaRPr>
+          </a:p>
+        </p:txBody>
+      </p:sp>
+      <p:sp>
+        <p:nvSpPr>
+          <p:cNvPr id="4" name="Slide Number Placeholder 3"/>
+          <p:cNvSpPr>
+            <a:spLocks noGrp="1"/>
+          </p:cNvSpPr>
+          <p:nvPr>
+            <p:ph type="sldNum" sz="quarter" idx="5"/>
+          </p:nvPr>
+        </p:nvSpPr>
+        <p:spPr/>
+        <p:txBody>
+          <a:bodyPr/>
+          <a:lstStyle/>
+          <a:p>
+            <a:fld id="{5B105CD6-096C-EA40-9B31-0FFB08AC29C0}" type="slidenum">
+              <a:rPr lang="en-US" smtClean="0"/>
+              <a:t>19</a:t>
+            </a:fld>
+            <a:endParaRPr lang="en-US"/>
+          </a:p>
+        </p:txBody>
+      </p:sp>
+    </p:spTree>
+    <p:extLst>
+      <p:ext uri="{BB962C8B-B14F-4D97-AF65-F5344CB8AC3E}">
+        <p14:creationId xmlns:p14="http://schemas.microsoft.com/office/powerpoint/2010/main" val="2897260459"/>
+      </p:ext>
+    </p:extLst>
+  </p:cSld>
+  <p:clrMapOvr>
+    <a:masterClrMapping/>
+  </p:clrMapOvr>
+</p:notes>
+</file>
+
+<file path=ppt/notesSlides/notesSlide18.xml><?xml version="1.0" encoding="utf-8"?>
+<p:notes xmlns:a="http://schemas.openxmlformats.org/drawingml/2006/main" xmlns:r="http://schemas.openxmlformats.org/officeDocument/2006/relationships" xmlns:p="http://schemas.openxmlformats.org/presentationml/2006/main">
+  <p:cSld>
+    <p:spTree>
+      <p:nvGrpSpPr>
+        <p:cNvPr id="1" name=""/>
+        <p:cNvGrpSpPr/>
+        <p:nvPr/>
+      </p:nvGrpSpPr>
+      <p:grpSpPr>
+        <a:xfrm>
+          <a:off x="0" y="0"/>
+          <a:ext cx="0" cy="0"/>
+          <a:chOff x="0" y="0"/>
+          <a:chExt cx="0" cy="0"/>
+        </a:xfrm>
+      </p:grpSpPr>
+      <p:sp>
+        <p:nvSpPr>
+          <p:cNvPr id="2" name="Slide Image Placeholder 1"/>
+          <p:cNvSpPr>
+            <a:spLocks noGrp="1" noRot="1" noChangeAspect="1"/>
+          </p:cNvSpPr>
+          <p:nvPr>
+            <p:ph type="sldImg"/>
+          </p:nvPr>
+        </p:nvSpPr>
+        <p:spPr/>
+      </p:sp>
+      <p:sp>
+        <p:nvSpPr>
+          <p:cNvPr id="3" name="Notes Placeholder 2"/>
+          <p:cNvSpPr>
+            <a:spLocks noGrp="1"/>
+          </p:cNvSpPr>
+          <p:nvPr>
+            <p:ph type="body" idx="1"/>
+          </p:nvPr>
+        </p:nvSpPr>
+        <p:spPr/>
+        <p:txBody>
+          <a:bodyPr/>
+          <a:lstStyle/>
+          <a:p>
+            <a:r>
+              <a:rPr lang="en-US" b="0" dirty="0">
+                <a:solidFill>
+                  <a:srgbClr val="CCCCCC"/>
+                </a:solidFill>
+                <a:effectLst/>
+                <a:latin typeface="Inconsolata NF Regular" pitchFamily="49" charset="77"/>
+              </a:rPr>
+              <a:t>Imposter Syndrome – Can I actually work on this on “my own”</a:t>
+            </a:r>
+          </a:p>
+          <a:p>
+            <a:r>
+              <a:rPr lang="en-US" b="0" dirty="0">
+                <a:solidFill>
+                  <a:srgbClr val="CCCCCC"/>
+                </a:solidFill>
+                <a:effectLst/>
+                <a:latin typeface="Inconsolata NF Regular" pitchFamily="49" charset="77"/>
+              </a:rPr>
+              <a:t>Letting people down (whether on not this was actually the case is an entire different discussion perhaps)</a:t>
+            </a:r>
+          </a:p>
+          <a:p>
+            <a:endParaRPr lang="en-US" b="0" dirty="0">
+              <a:solidFill>
+                <a:srgbClr val="CCCCCC"/>
+              </a:solidFill>
+              <a:effectLst/>
+              <a:latin typeface="Inconsolata NF Regular" pitchFamily="49" charset="77"/>
+            </a:endParaRPr>
+          </a:p>
+          <a:p>
+            <a:endParaRPr lang="en-US" b="0" dirty="0">
+              <a:solidFill>
+                <a:srgbClr val="CCCCCC"/>
+              </a:solidFill>
+              <a:effectLst/>
+              <a:latin typeface="Inconsolata NF Regular" pitchFamily="49" charset="77"/>
+            </a:endParaRPr>
+          </a:p>
+        </p:txBody>
+      </p:sp>
+      <p:sp>
+        <p:nvSpPr>
+          <p:cNvPr id="4" name="Slide Number Placeholder 3"/>
+          <p:cNvSpPr>
+            <a:spLocks noGrp="1"/>
+          </p:cNvSpPr>
+          <p:nvPr>
+            <p:ph type="sldNum" sz="quarter" idx="5"/>
+          </p:nvPr>
+        </p:nvSpPr>
+        <p:spPr/>
+        <p:txBody>
+          <a:bodyPr/>
+          <a:lstStyle/>
+          <a:p>
+            <a:fld id="{5B105CD6-096C-EA40-9B31-0FFB08AC29C0}" type="slidenum">
+              <a:rPr lang="en-US" smtClean="0"/>
+              <a:t>20</a:t>
+            </a:fld>
+            <a:endParaRPr lang="en-US"/>
+          </a:p>
+        </p:txBody>
+      </p:sp>
+    </p:spTree>
+    <p:extLst>
+      <p:ext uri="{BB962C8B-B14F-4D97-AF65-F5344CB8AC3E}">
+        <p14:creationId xmlns:p14="http://schemas.microsoft.com/office/powerpoint/2010/main" val="4130675104"/>
+      </p:ext>
+    </p:extLst>
+  </p:cSld>
+  <p:clrMapOvr>
+    <a:masterClrMapping/>
+  </p:clrMapOvr>
+</p:notes>
+</file>
+
+<file path=ppt/notesSlides/notesSlide19.xml><?xml version="1.0" encoding="utf-8"?>
+<p:notes xmlns:a="http://schemas.openxmlformats.org/drawingml/2006/main" xmlns:r="http://schemas.openxmlformats.org/officeDocument/2006/relationships" xmlns:p="http://schemas.openxmlformats.org/presentationml/2006/main">
+  <p:cSld>
+    <p:spTree>
+      <p:nvGrpSpPr>
+        <p:cNvPr id="1" name=""/>
+        <p:cNvGrpSpPr/>
+        <p:nvPr/>
+      </p:nvGrpSpPr>
+      <p:grpSpPr>
+        <a:xfrm>
+          <a:off x="0" y="0"/>
+          <a:ext cx="0" cy="0"/>
+          <a:chOff x="0" y="0"/>
+          <a:chExt cx="0" cy="0"/>
+        </a:xfrm>
+      </p:grpSpPr>
+      <p:sp>
+        <p:nvSpPr>
+          <p:cNvPr id="2" name="Slide Image Placeholder 1"/>
+          <p:cNvSpPr>
+            <a:spLocks noGrp="1" noRot="1" noChangeAspect="1"/>
+          </p:cNvSpPr>
+          <p:nvPr>
+            <p:ph type="sldImg"/>
+          </p:nvPr>
+        </p:nvSpPr>
+        <p:spPr/>
+      </p:sp>
+      <p:sp>
+        <p:nvSpPr>
+          <p:cNvPr id="3" name="Notes Placeholder 2"/>
+          <p:cNvSpPr>
+            <a:spLocks noGrp="1"/>
+          </p:cNvSpPr>
+          <p:nvPr>
+            <p:ph type="body" idx="1"/>
+          </p:nvPr>
+        </p:nvSpPr>
+        <p:spPr/>
+        <p:txBody>
+          <a:bodyPr/>
+          <a:lstStyle/>
+          <a:p>
+            <a:r>
+              <a:rPr lang="en-US" b="0" dirty="0" err="1">
+                <a:solidFill>
+                  <a:srgbClr val="CCCCCC"/>
+                </a:solidFill>
+                <a:effectLst/>
+                <a:latin typeface="Inconsolata NF Regular" pitchFamily="49" charset="77"/>
+              </a:rPr>
+              <a:t>Ultimatly</a:t>
+            </a:r>
+            <a:r>
+              <a:rPr lang="en-US" b="0" dirty="0">
+                <a:solidFill>
+                  <a:srgbClr val="CCCCCC"/>
+                </a:solidFill>
+                <a:effectLst/>
+                <a:latin typeface="Inconsolata NF Regular" pitchFamily="49" charset="77"/>
+              </a:rPr>
+              <a:t> I decided to give it a shot, even though I would be on my own mostly because of a talk that Carlton Gibson gave at </a:t>
+            </a:r>
+            <a:r>
+              <a:rPr lang="en-US" b="0" dirty="0" err="1">
+                <a:solidFill>
+                  <a:srgbClr val="CCCCCC"/>
+                </a:solidFill>
+                <a:effectLst/>
+                <a:latin typeface="Inconsolata NF Regular" pitchFamily="49" charset="77"/>
+              </a:rPr>
+              <a:t>DjangoCon</a:t>
+            </a:r>
+            <a:r>
+              <a:rPr lang="en-US" b="0" dirty="0">
+                <a:solidFill>
+                  <a:srgbClr val="CCCCCC"/>
+                </a:solidFill>
+                <a:effectLst/>
+                <a:latin typeface="Inconsolata NF Regular" pitchFamily="49" charset="77"/>
+              </a:rPr>
+              <a:t> US 2018 “Your Framework Needs You”</a:t>
+            </a:r>
+          </a:p>
+        </p:txBody>
+      </p:sp>
+      <p:sp>
+        <p:nvSpPr>
+          <p:cNvPr id="4" name="Slide Number Placeholder 3"/>
+          <p:cNvSpPr>
+            <a:spLocks noGrp="1"/>
+          </p:cNvSpPr>
+          <p:nvPr>
+            <p:ph type="sldNum" sz="quarter" idx="5"/>
+          </p:nvPr>
+        </p:nvSpPr>
+        <p:spPr/>
+        <p:txBody>
+          <a:bodyPr/>
+          <a:lstStyle/>
+          <a:p>
+            <a:fld id="{5B105CD6-096C-EA40-9B31-0FFB08AC29C0}" type="slidenum">
+              <a:rPr lang="en-US" smtClean="0"/>
+              <a:t>21</a:t>
+            </a:fld>
+            <a:endParaRPr lang="en-US"/>
+          </a:p>
+        </p:txBody>
+      </p:sp>
+    </p:spTree>
+    <p:extLst>
+      <p:ext uri="{BB962C8B-B14F-4D97-AF65-F5344CB8AC3E}">
+        <p14:creationId xmlns:p14="http://schemas.microsoft.com/office/powerpoint/2010/main" val="170963123"/>
       </p:ext>
     </p:extLst>
   </p:cSld>
@@ -1018,6 +2115,1287 @@
 </p:notes>
 </file>
 
+<file path=ppt/notesSlides/notesSlide20.xml><?xml version="1.0" encoding="utf-8"?>
+<p:notes xmlns:a="http://schemas.openxmlformats.org/drawingml/2006/main" xmlns:r="http://schemas.openxmlformats.org/officeDocument/2006/relationships" xmlns:p="http://schemas.openxmlformats.org/presentationml/2006/main">
+  <p:cSld>
+    <p:spTree>
+      <p:nvGrpSpPr>
+        <p:cNvPr id="1" name=""/>
+        <p:cNvGrpSpPr/>
+        <p:nvPr/>
+      </p:nvGrpSpPr>
+      <p:grpSpPr>
+        <a:xfrm>
+          <a:off x="0" y="0"/>
+          <a:ext cx="0" cy="0"/>
+          <a:chOff x="0" y="0"/>
+          <a:chExt cx="0" cy="0"/>
+        </a:xfrm>
+      </p:grpSpPr>
+      <p:sp>
+        <p:nvSpPr>
+          <p:cNvPr id="2" name="Slide Image Placeholder 1"/>
+          <p:cNvSpPr>
+            <a:spLocks noGrp="1" noRot="1" noChangeAspect="1"/>
+          </p:cNvSpPr>
+          <p:nvPr>
+            <p:ph type="sldImg"/>
+          </p:nvPr>
+        </p:nvSpPr>
+        <p:spPr/>
+      </p:sp>
+      <p:sp>
+        <p:nvSpPr>
+          <p:cNvPr id="3" name="Notes Placeholder 2"/>
+          <p:cNvSpPr>
+            <a:spLocks noGrp="1"/>
+          </p:cNvSpPr>
+          <p:nvPr>
+            <p:ph type="body" idx="1"/>
+          </p:nvPr>
+        </p:nvSpPr>
+        <p:spPr/>
+        <p:txBody>
+          <a:bodyPr/>
+          <a:lstStyle/>
+          <a:p>
+            <a:r>
+              <a:rPr lang="en-US" b="0" dirty="0">
+                <a:solidFill>
+                  <a:srgbClr val="CCCCCC"/>
+                </a:solidFill>
+                <a:effectLst/>
+                <a:latin typeface="Inconsolata NF Regular" pitchFamily="49" charset="77"/>
+              </a:rPr>
+              <a:t>So I went to work on the ticket and did what most of us do when we’re assigned a ticket for work, or on a personal project</a:t>
+            </a:r>
+          </a:p>
+          <a:p>
+            <a:endParaRPr lang="en-US" b="0" dirty="0">
+              <a:solidFill>
+                <a:srgbClr val="CCCCCC"/>
+              </a:solidFill>
+              <a:effectLst/>
+              <a:latin typeface="Inconsolata NF Regular" pitchFamily="49" charset="77"/>
+            </a:endParaRPr>
+          </a:p>
+          <a:p>
+            <a:pPr marL="171450" indent="-171450">
+              <a:buFontTx/>
+              <a:buChar char="-"/>
+            </a:pPr>
+            <a:r>
+              <a:rPr lang="en-US" b="0" dirty="0">
+                <a:solidFill>
+                  <a:srgbClr val="CCCCCC"/>
+                </a:solidFill>
+                <a:effectLst/>
+                <a:latin typeface="Inconsolata NF Regular" pitchFamily="49" charset="77"/>
+              </a:rPr>
+              <a:t>Replicate the Bug</a:t>
+            </a:r>
+          </a:p>
+          <a:p>
+            <a:pPr marL="171450" indent="-171450">
+              <a:buFontTx/>
+              <a:buChar char="-"/>
+            </a:pPr>
+            <a:r>
+              <a:rPr lang="en-US" b="0" dirty="0">
+                <a:solidFill>
+                  <a:srgbClr val="CCCCCC"/>
+                </a:solidFill>
+                <a:effectLst/>
+                <a:latin typeface="Inconsolata NF Regular" pitchFamily="49" charset="77"/>
+              </a:rPr>
+              <a:t>Read some docs</a:t>
+            </a:r>
+          </a:p>
+          <a:p>
+            <a:pPr marL="171450" indent="-171450">
+              <a:buFontTx/>
+              <a:buChar char="-"/>
+            </a:pPr>
+            <a:r>
+              <a:rPr lang="en-US" b="0" dirty="0">
+                <a:solidFill>
+                  <a:srgbClr val="CCCCCC"/>
+                </a:solidFill>
+                <a:effectLst/>
+                <a:latin typeface="Inconsolata NF Regular" pitchFamily="49" charset="77"/>
+              </a:rPr>
+              <a:t>Write down what you’re learning as you’re learning … because we all do this, right? </a:t>
+            </a:r>
+          </a:p>
+          <a:p>
+            <a:pPr marL="171450" indent="-171450">
+              <a:buFontTx/>
+              <a:buChar char="-"/>
+            </a:pPr>
+            <a:endParaRPr lang="en-US" b="0" dirty="0">
+              <a:solidFill>
+                <a:srgbClr val="CCCCCC"/>
+              </a:solidFill>
+              <a:effectLst/>
+              <a:latin typeface="Inconsolata NF Regular" pitchFamily="49" charset="77"/>
+            </a:endParaRPr>
+          </a:p>
+          <a:p>
+            <a:pPr marL="0" indent="0">
+              <a:buFontTx/>
+              <a:buNone/>
+            </a:pPr>
+            <a:r>
+              <a:rPr lang="en-US" b="0" dirty="0">
+                <a:solidFill>
+                  <a:srgbClr val="CCCCCC"/>
+                </a:solidFill>
+                <a:effectLst/>
+                <a:latin typeface="Inconsolata NF Regular" pitchFamily="49" charset="77"/>
+              </a:rPr>
+              <a:t>I didn’t, until I saw this talk by Simon Willison at </a:t>
+            </a:r>
+            <a:r>
+              <a:rPr lang="en-US" b="0" dirty="0" err="1">
+                <a:solidFill>
+                  <a:srgbClr val="CCCCCC"/>
+                </a:solidFill>
+                <a:effectLst/>
+                <a:latin typeface="Inconsolata NF Regular" pitchFamily="49" charset="77"/>
+              </a:rPr>
+              <a:t>DjangoCon</a:t>
+            </a:r>
+            <a:r>
+              <a:rPr lang="en-US" b="0" dirty="0">
+                <a:solidFill>
+                  <a:srgbClr val="CCCCCC"/>
+                </a:solidFill>
+                <a:effectLst/>
+                <a:latin typeface="Inconsolata NF Regular" pitchFamily="49" charset="77"/>
+              </a:rPr>
+              <a:t> US 2022</a:t>
+            </a:r>
+          </a:p>
+        </p:txBody>
+      </p:sp>
+      <p:sp>
+        <p:nvSpPr>
+          <p:cNvPr id="4" name="Slide Number Placeholder 3"/>
+          <p:cNvSpPr>
+            <a:spLocks noGrp="1"/>
+          </p:cNvSpPr>
+          <p:nvPr>
+            <p:ph type="sldNum" sz="quarter" idx="5"/>
+          </p:nvPr>
+        </p:nvSpPr>
+        <p:spPr/>
+        <p:txBody>
+          <a:bodyPr/>
+          <a:lstStyle/>
+          <a:p>
+            <a:fld id="{5B105CD6-096C-EA40-9B31-0FFB08AC29C0}" type="slidenum">
+              <a:rPr lang="en-US" smtClean="0"/>
+              <a:t>22</a:t>
+            </a:fld>
+            <a:endParaRPr lang="en-US"/>
+          </a:p>
+        </p:txBody>
+      </p:sp>
+    </p:spTree>
+    <p:extLst>
+      <p:ext uri="{BB962C8B-B14F-4D97-AF65-F5344CB8AC3E}">
+        <p14:creationId xmlns:p14="http://schemas.microsoft.com/office/powerpoint/2010/main" val="1062657905"/>
+      </p:ext>
+    </p:extLst>
+  </p:cSld>
+  <p:clrMapOvr>
+    <a:masterClrMapping/>
+  </p:clrMapOvr>
+</p:notes>
+</file>
+
+<file path=ppt/notesSlides/notesSlide21.xml><?xml version="1.0" encoding="utf-8"?>
+<p:notes xmlns:a="http://schemas.openxmlformats.org/drawingml/2006/main" xmlns:r="http://schemas.openxmlformats.org/officeDocument/2006/relationships" xmlns:p="http://schemas.openxmlformats.org/presentationml/2006/main">
+  <p:cSld>
+    <p:spTree>
+      <p:nvGrpSpPr>
+        <p:cNvPr id="1" name=""/>
+        <p:cNvGrpSpPr/>
+        <p:nvPr/>
+      </p:nvGrpSpPr>
+      <p:grpSpPr>
+        <a:xfrm>
+          <a:off x="0" y="0"/>
+          <a:ext cx="0" cy="0"/>
+          <a:chOff x="0" y="0"/>
+          <a:chExt cx="0" cy="0"/>
+        </a:xfrm>
+      </p:grpSpPr>
+      <p:sp>
+        <p:nvSpPr>
+          <p:cNvPr id="2" name="Slide Image Placeholder 1"/>
+          <p:cNvSpPr>
+            <a:spLocks noGrp="1" noRot="1" noChangeAspect="1"/>
+          </p:cNvSpPr>
+          <p:nvPr>
+            <p:ph type="sldImg"/>
+          </p:nvPr>
+        </p:nvSpPr>
+        <p:spPr/>
+      </p:sp>
+      <p:sp>
+        <p:nvSpPr>
+          <p:cNvPr id="3" name="Notes Placeholder 2"/>
+          <p:cNvSpPr>
+            <a:spLocks noGrp="1"/>
+          </p:cNvSpPr>
+          <p:nvPr>
+            <p:ph type="body" idx="1"/>
+          </p:nvPr>
+        </p:nvSpPr>
+        <p:spPr/>
+        <p:txBody>
+          <a:bodyPr/>
+          <a:lstStyle/>
+          <a:p>
+            <a:r>
+              <a:rPr lang="en-US" b="0" dirty="0">
+                <a:solidFill>
+                  <a:srgbClr val="CCCCCC"/>
+                </a:solidFill>
+                <a:effectLst/>
+                <a:latin typeface="Inconsolata NF Regular" pitchFamily="49" charset="77"/>
+              </a:rPr>
+              <a:t>At </a:t>
+            </a:r>
+            <a:r>
+              <a:rPr lang="en-US" b="0" dirty="0" err="1">
+                <a:solidFill>
+                  <a:srgbClr val="CCCCCC"/>
+                </a:solidFill>
+                <a:effectLst/>
+                <a:latin typeface="Inconsolata NF Regular" pitchFamily="49" charset="77"/>
+              </a:rPr>
+              <a:t>DjangoCon</a:t>
+            </a:r>
+            <a:r>
+              <a:rPr lang="en-US" b="0" dirty="0">
+                <a:solidFill>
+                  <a:srgbClr val="CCCCCC"/>
+                </a:solidFill>
+                <a:effectLst/>
+                <a:latin typeface="Inconsolata NF Regular" pitchFamily="49" charset="77"/>
+              </a:rPr>
+              <a:t> 2022 Simon Willison gave a great talk which included an idea called ‘public notes’. I highly recommend that talk</a:t>
+            </a:r>
+          </a:p>
+          <a:p>
+            <a:endParaRPr lang="en-US" b="0" dirty="0">
+              <a:solidFill>
+                <a:srgbClr val="CCCCCC"/>
+              </a:solidFill>
+              <a:effectLst/>
+              <a:latin typeface="Inconsolata NF Regular" pitchFamily="49" charset="77"/>
+            </a:endParaRPr>
+          </a:p>
+          <a:p>
+            <a:r>
+              <a:rPr lang="en-US" b="0" dirty="0">
+                <a:solidFill>
+                  <a:srgbClr val="CCCCCC"/>
+                </a:solidFill>
+                <a:effectLst/>
+                <a:latin typeface="Inconsolata NF Regular" pitchFamily="49" charset="77"/>
+              </a:rPr>
+              <a:t>Essentially you use an issue (in this case a GitHub issue) as a spot to work through a problem and leave yourself bread crumbs for what you’ve tried and learned. </a:t>
+            </a:r>
+          </a:p>
+        </p:txBody>
+      </p:sp>
+      <p:sp>
+        <p:nvSpPr>
+          <p:cNvPr id="4" name="Slide Number Placeholder 3"/>
+          <p:cNvSpPr>
+            <a:spLocks noGrp="1"/>
+          </p:cNvSpPr>
+          <p:nvPr>
+            <p:ph type="sldNum" sz="quarter" idx="5"/>
+          </p:nvPr>
+        </p:nvSpPr>
+        <p:spPr/>
+        <p:txBody>
+          <a:bodyPr/>
+          <a:lstStyle/>
+          <a:p>
+            <a:fld id="{5B105CD6-096C-EA40-9B31-0FFB08AC29C0}" type="slidenum">
+              <a:rPr lang="en-US" smtClean="0"/>
+              <a:t>23</a:t>
+            </a:fld>
+            <a:endParaRPr lang="en-US"/>
+          </a:p>
+        </p:txBody>
+      </p:sp>
+    </p:spTree>
+    <p:extLst>
+      <p:ext uri="{BB962C8B-B14F-4D97-AF65-F5344CB8AC3E}">
+        <p14:creationId xmlns:p14="http://schemas.microsoft.com/office/powerpoint/2010/main" val="3719330951"/>
+      </p:ext>
+    </p:extLst>
+  </p:cSld>
+  <p:clrMapOvr>
+    <a:masterClrMapping/>
+  </p:clrMapOvr>
+</p:notes>
+</file>
+
+<file path=ppt/notesSlides/notesSlide22.xml><?xml version="1.0" encoding="utf-8"?>
+<p:notes xmlns:a="http://schemas.openxmlformats.org/drawingml/2006/main" xmlns:r="http://schemas.openxmlformats.org/officeDocument/2006/relationships" xmlns:p="http://schemas.openxmlformats.org/presentationml/2006/main">
+  <p:cSld>
+    <p:spTree>
+      <p:nvGrpSpPr>
+        <p:cNvPr id="1" name=""/>
+        <p:cNvGrpSpPr/>
+        <p:nvPr/>
+      </p:nvGrpSpPr>
+      <p:grpSpPr>
+        <a:xfrm>
+          <a:off x="0" y="0"/>
+          <a:ext cx="0" cy="0"/>
+          <a:chOff x="0" y="0"/>
+          <a:chExt cx="0" cy="0"/>
+        </a:xfrm>
+      </p:grpSpPr>
+      <p:sp>
+        <p:nvSpPr>
+          <p:cNvPr id="2" name="Slide Image Placeholder 1"/>
+          <p:cNvSpPr>
+            <a:spLocks noGrp="1" noRot="1" noChangeAspect="1"/>
+          </p:cNvSpPr>
+          <p:nvPr>
+            <p:ph type="sldImg"/>
+          </p:nvPr>
+        </p:nvSpPr>
+        <p:spPr/>
+      </p:sp>
+      <p:sp>
+        <p:nvSpPr>
+          <p:cNvPr id="3" name="Notes Placeholder 2"/>
+          <p:cNvSpPr>
+            <a:spLocks noGrp="1"/>
+          </p:cNvSpPr>
+          <p:nvPr>
+            <p:ph type="body" idx="1"/>
+          </p:nvPr>
+        </p:nvSpPr>
+        <p:spPr/>
+        <p:txBody>
+          <a:bodyPr/>
+          <a:lstStyle/>
+          <a:p>
+            <a:r>
+              <a:rPr lang="en-US" b="0" dirty="0">
+                <a:solidFill>
+                  <a:srgbClr val="CCCCCC"/>
+                </a:solidFill>
+                <a:effectLst/>
+                <a:latin typeface="Inconsolata NF Regular" pitchFamily="49" charset="77"/>
+              </a:rPr>
+              <a:t>At </a:t>
+            </a:r>
+            <a:r>
+              <a:rPr lang="en-US" b="0" dirty="0" err="1">
+                <a:solidFill>
+                  <a:srgbClr val="CCCCCC"/>
+                </a:solidFill>
+                <a:effectLst/>
+                <a:latin typeface="Inconsolata NF Regular" pitchFamily="49" charset="77"/>
+              </a:rPr>
+              <a:t>DjangoCon</a:t>
+            </a:r>
+            <a:r>
+              <a:rPr lang="en-US" b="0" dirty="0">
+                <a:solidFill>
+                  <a:srgbClr val="CCCCCC"/>
+                </a:solidFill>
+                <a:effectLst/>
+                <a:latin typeface="Inconsolata NF Regular" pitchFamily="49" charset="77"/>
+              </a:rPr>
+              <a:t> 2022 Simon Willison gave a great talk which included an idea called ‘public notes’. I highly recommend that talk</a:t>
+            </a:r>
+          </a:p>
+          <a:p>
+            <a:endParaRPr lang="en-US" b="0" dirty="0">
+              <a:solidFill>
+                <a:srgbClr val="CCCCCC"/>
+              </a:solidFill>
+              <a:effectLst/>
+              <a:latin typeface="Inconsolata NF Regular" pitchFamily="49" charset="77"/>
+            </a:endParaRPr>
+          </a:p>
+          <a:p>
+            <a:r>
+              <a:rPr lang="en-US" b="0" dirty="0">
+                <a:solidFill>
+                  <a:srgbClr val="CCCCCC"/>
+                </a:solidFill>
+                <a:effectLst/>
+                <a:latin typeface="Inconsolata NF Regular" pitchFamily="49" charset="77"/>
+              </a:rPr>
+              <a:t>Essentially you use an issue (in this case a GitHub issue) as a spot to work through a problem and leave yourself bread crumbs for what you’ve tried and learned. </a:t>
+            </a:r>
+          </a:p>
+          <a:p>
+            <a:endParaRPr lang="en-US" b="0" dirty="0">
+              <a:solidFill>
+                <a:srgbClr val="CCCCCC"/>
+              </a:solidFill>
+              <a:effectLst/>
+              <a:latin typeface="Inconsolata NF Regular" pitchFamily="49" charset="77"/>
+            </a:endParaRPr>
+          </a:p>
+          <a:p>
+            <a:r>
+              <a:rPr lang="en-US" b="0" dirty="0">
+                <a:solidFill>
+                  <a:srgbClr val="CCCCCC"/>
+                </a:solidFill>
+                <a:effectLst/>
+                <a:latin typeface="Inconsolata NF Regular" pitchFamily="49" charset="77"/>
+              </a:rPr>
+              <a:t>In my notes there’s a lot of back and forth, two steps backward, 1 step forward kind of things, but even looking at it now, I can see my thought process for how the bug ended up getting fixed</a:t>
+            </a:r>
+          </a:p>
+        </p:txBody>
+      </p:sp>
+      <p:sp>
+        <p:nvSpPr>
+          <p:cNvPr id="4" name="Slide Number Placeholder 3"/>
+          <p:cNvSpPr>
+            <a:spLocks noGrp="1"/>
+          </p:cNvSpPr>
+          <p:nvPr>
+            <p:ph type="sldNum" sz="quarter" idx="5"/>
+          </p:nvPr>
+        </p:nvSpPr>
+        <p:spPr/>
+        <p:txBody>
+          <a:bodyPr/>
+          <a:lstStyle/>
+          <a:p>
+            <a:fld id="{5B105CD6-096C-EA40-9B31-0FFB08AC29C0}" type="slidenum">
+              <a:rPr lang="en-US" smtClean="0"/>
+              <a:t>24</a:t>
+            </a:fld>
+            <a:endParaRPr lang="en-US"/>
+          </a:p>
+        </p:txBody>
+      </p:sp>
+    </p:spTree>
+    <p:extLst>
+      <p:ext uri="{BB962C8B-B14F-4D97-AF65-F5344CB8AC3E}">
+        <p14:creationId xmlns:p14="http://schemas.microsoft.com/office/powerpoint/2010/main" val="3982428885"/>
+      </p:ext>
+    </p:extLst>
+  </p:cSld>
+  <p:clrMapOvr>
+    <a:masterClrMapping/>
+  </p:clrMapOvr>
+</p:notes>
+</file>
+
+<file path=ppt/notesSlides/notesSlide23.xml><?xml version="1.0" encoding="utf-8"?>
+<p:notes xmlns:a="http://schemas.openxmlformats.org/drawingml/2006/main" xmlns:r="http://schemas.openxmlformats.org/officeDocument/2006/relationships" xmlns:p="http://schemas.openxmlformats.org/presentationml/2006/main">
+  <p:cSld>
+    <p:spTree>
+      <p:nvGrpSpPr>
+        <p:cNvPr id="1" name=""/>
+        <p:cNvGrpSpPr/>
+        <p:nvPr/>
+      </p:nvGrpSpPr>
+      <p:grpSpPr>
+        <a:xfrm>
+          <a:off x="0" y="0"/>
+          <a:ext cx="0" cy="0"/>
+          <a:chOff x="0" y="0"/>
+          <a:chExt cx="0" cy="0"/>
+        </a:xfrm>
+      </p:grpSpPr>
+      <p:sp>
+        <p:nvSpPr>
+          <p:cNvPr id="2" name="Slide Image Placeholder 1"/>
+          <p:cNvSpPr>
+            <a:spLocks noGrp="1" noRot="1" noChangeAspect="1"/>
+          </p:cNvSpPr>
+          <p:nvPr>
+            <p:ph type="sldImg"/>
+          </p:nvPr>
+        </p:nvSpPr>
+        <p:spPr/>
+      </p:sp>
+      <p:sp>
+        <p:nvSpPr>
+          <p:cNvPr id="3" name="Notes Placeholder 2"/>
+          <p:cNvSpPr>
+            <a:spLocks noGrp="1"/>
+          </p:cNvSpPr>
+          <p:nvPr>
+            <p:ph type="body" idx="1"/>
+          </p:nvPr>
+        </p:nvSpPr>
+        <p:spPr/>
+        <p:txBody>
+          <a:bodyPr/>
+          <a:lstStyle/>
+          <a:p>
+            <a:r>
+              <a:rPr lang="en-US" b="0" dirty="0">
+                <a:solidFill>
+                  <a:srgbClr val="CCCCCC"/>
+                </a:solidFill>
+                <a:effectLst/>
+                <a:latin typeface="Inconsolata NF Regular" pitchFamily="49" charset="77"/>
+              </a:rPr>
+              <a:t>Ultimately the fix was made but it wasn’t just *me* that did this. I had a lot of help in getting the code to the right spot. </a:t>
+            </a:r>
+          </a:p>
+          <a:p>
+            <a:endParaRPr lang="en-US" b="0" dirty="0">
+              <a:solidFill>
+                <a:srgbClr val="CCCCCC"/>
+              </a:solidFill>
+              <a:effectLst/>
+              <a:latin typeface="Inconsolata NF Regular" pitchFamily="49" charset="77"/>
+            </a:endParaRPr>
+          </a:p>
+          <a:p>
+            <a:r>
+              <a:rPr lang="en-US" b="0" dirty="0">
+                <a:solidFill>
+                  <a:srgbClr val="CCCCCC"/>
+                </a:solidFill>
+                <a:effectLst/>
+                <a:latin typeface="Inconsolata NF Regular" pitchFamily="49" charset="77"/>
+              </a:rPr>
+              <a:t>Nick Pope</a:t>
+            </a:r>
+          </a:p>
+          <a:p>
+            <a:r>
+              <a:rPr lang="en-US" b="0" dirty="0">
+                <a:solidFill>
+                  <a:srgbClr val="CCCCCC"/>
+                </a:solidFill>
+                <a:effectLst/>
+                <a:latin typeface="Inconsolata NF Regular" pitchFamily="49" charset="77"/>
+              </a:rPr>
+              <a:t>Shia Berger</a:t>
+            </a:r>
+          </a:p>
+          <a:p>
+            <a:r>
+              <a:rPr lang="en-US" b="0" dirty="0">
+                <a:solidFill>
+                  <a:srgbClr val="CCCCCC"/>
+                </a:solidFill>
+                <a:effectLst/>
+                <a:latin typeface="Inconsolata NF Regular" pitchFamily="49" charset="77"/>
+              </a:rPr>
+              <a:t>Simon Charette</a:t>
+            </a:r>
+          </a:p>
+          <a:p>
+            <a:pPr algn="l"/>
+            <a:r>
+              <a:rPr lang="en-US" b="0" i="0" dirty="0">
+                <a:solidFill>
+                  <a:srgbClr val="999999"/>
+                </a:solidFill>
+                <a:effectLst/>
+                <a:latin typeface="Roboto" panose="020F0502020204030204" pitchFamily="34" charset="0"/>
+              </a:rPr>
+              <a:t>Mariusz </a:t>
+            </a:r>
+            <a:r>
+              <a:rPr lang="en-US" b="0" i="0" dirty="0" err="1">
+                <a:solidFill>
+                  <a:srgbClr val="999999"/>
+                </a:solidFill>
+                <a:effectLst/>
+                <a:latin typeface="Roboto" panose="020F0502020204030204" pitchFamily="34" charset="0"/>
+              </a:rPr>
+              <a:t>Felisiak</a:t>
+            </a:r>
+            <a:endParaRPr lang="en-US" b="0" i="0" dirty="0">
+              <a:solidFill>
+                <a:srgbClr val="999999"/>
+              </a:solidFill>
+              <a:effectLst/>
+              <a:latin typeface="Roboto" panose="020F0502020204030204" pitchFamily="34" charset="0"/>
+            </a:endParaRPr>
+          </a:p>
+        </p:txBody>
+      </p:sp>
+      <p:sp>
+        <p:nvSpPr>
+          <p:cNvPr id="4" name="Slide Number Placeholder 3"/>
+          <p:cNvSpPr>
+            <a:spLocks noGrp="1"/>
+          </p:cNvSpPr>
+          <p:nvPr>
+            <p:ph type="sldNum" sz="quarter" idx="5"/>
+          </p:nvPr>
+        </p:nvSpPr>
+        <p:spPr/>
+        <p:txBody>
+          <a:bodyPr/>
+          <a:lstStyle/>
+          <a:p>
+            <a:fld id="{5B105CD6-096C-EA40-9B31-0FFB08AC29C0}" type="slidenum">
+              <a:rPr lang="en-US" smtClean="0"/>
+              <a:t>25</a:t>
+            </a:fld>
+            <a:endParaRPr lang="en-US"/>
+          </a:p>
+        </p:txBody>
+      </p:sp>
+    </p:spTree>
+    <p:extLst>
+      <p:ext uri="{BB962C8B-B14F-4D97-AF65-F5344CB8AC3E}">
+        <p14:creationId xmlns:p14="http://schemas.microsoft.com/office/powerpoint/2010/main" val="3674510882"/>
+      </p:ext>
+    </p:extLst>
+  </p:cSld>
+  <p:clrMapOvr>
+    <a:masterClrMapping/>
+  </p:clrMapOvr>
+</p:notes>
+</file>
+
+<file path=ppt/notesSlides/notesSlide24.xml><?xml version="1.0" encoding="utf-8"?>
+<p:notes xmlns:a="http://schemas.openxmlformats.org/drawingml/2006/main" xmlns:r="http://schemas.openxmlformats.org/officeDocument/2006/relationships" xmlns:p="http://schemas.openxmlformats.org/presentationml/2006/main">
+  <p:cSld>
+    <p:spTree>
+      <p:nvGrpSpPr>
+        <p:cNvPr id="1" name=""/>
+        <p:cNvGrpSpPr/>
+        <p:nvPr/>
+      </p:nvGrpSpPr>
+      <p:grpSpPr>
+        <a:xfrm>
+          <a:off x="0" y="0"/>
+          <a:ext cx="0" cy="0"/>
+          <a:chOff x="0" y="0"/>
+          <a:chExt cx="0" cy="0"/>
+        </a:xfrm>
+      </p:grpSpPr>
+      <p:sp>
+        <p:nvSpPr>
+          <p:cNvPr id="2" name="Slide Image Placeholder 1"/>
+          <p:cNvSpPr>
+            <a:spLocks noGrp="1" noRot="1" noChangeAspect="1"/>
+          </p:cNvSpPr>
+          <p:nvPr>
+            <p:ph type="sldImg"/>
+          </p:nvPr>
+        </p:nvSpPr>
+        <p:spPr/>
+      </p:sp>
+      <p:sp>
+        <p:nvSpPr>
+          <p:cNvPr id="3" name="Notes Placeholder 2"/>
+          <p:cNvSpPr>
+            <a:spLocks noGrp="1"/>
+          </p:cNvSpPr>
+          <p:nvPr>
+            <p:ph type="body" idx="1"/>
+          </p:nvPr>
+        </p:nvSpPr>
+        <p:spPr/>
+        <p:txBody>
+          <a:bodyPr/>
+          <a:lstStyle/>
+          <a:p>
+            <a:r>
+              <a:rPr lang="en-US" b="0" i="0" dirty="0">
+                <a:solidFill>
+                  <a:srgbClr val="999999"/>
+                </a:solidFill>
+                <a:effectLst/>
+                <a:latin typeface="Roboto" panose="020F0502020204030204" pitchFamily="34" charset="0"/>
+              </a:rPr>
+              <a:t>Any time you use the work ‘just’ in a statement, there’s potentially a lot to unpack. </a:t>
+            </a:r>
+          </a:p>
+          <a:p>
+            <a:endParaRPr lang="en-US" b="0" i="0" dirty="0">
+              <a:solidFill>
+                <a:srgbClr val="999999"/>
+              </a:solidFill>
+              <a:effectLst/>
+              <a:latin typeface="Roboto" panose="020F0502020204030204" pitchFamily="34" charset="0"/>
+            </a:endParaRPr>
+          </a:p>
+          <a:p>
+            <a:r>
+              <a:rPr lang="en-US" b="0" i="0" dirty="0">
+                <a:solidFill>
+                  <a:srgbClr val="999999"/>
+                </a:solidFill>
+                <a:effectLst/>
+                <a:latin typeface="Roboto" panose="020F0502020204030204" pitchFamily="34" charset="0"/>
+              </a:rPr>
+              <a:t>In this room if I say something like “It’s just Rust” or “It’s just Go” while presenting a solution to a problem, that ‘just’ can turn off a lot of people. </a:t>
+            </a:r>
+          </a:p>
+          <a:p>
+            <a:endParaRPr lang="en-US" b="0" i="0" dirty="0">
+              <a:solidFill>
+                <a:srgbClr val="999999"/>
+              </a:solidFill>
+              <a:effectLst/>
+              <a:latin typeface="Roboto" panose="020F0502020204030204" pitchFamily="34" charset="0"/>
+            </a:endParaRPr>
+          </a:p>
+          <a:p>
+            <a:r>
+              <a:rPr lang="en-US" b="0" i="0" dirty="0">
+                <a:solidFill>
+                  <a:srgbClr val="999999"/>
+                </a:solidFill>
+                <a:effectLst/>
+                <a:latin typeface="Roboto" panose="020F0502020204030204" pitchFamily="34" charset="0"/>
+              </a:rPr>
+              <a:t>And so I say this with as much kindness as possible given that this is a room full of </a:t>
+            </a:r>
+            <a:r>
+              <a:rPr lang="en-US" b="0" i="0" dirty="0" err="1">
+                <a:solidFill>
+                  <a:srgbClr val="999999"/>
+                </a:solidFill>
+                <a:effectLst/>
+                <a:latin typeface="Roboto" panose="020F0502020204030204" pitchFamily="34" charset="0"/>
+              </a:rPr>
+              <a:t>Djangonauts</a:t>
+            </a:r>
+            <a:r>
+              <a:rPr lang="en-US" b="0" i="0" dirty="0">
+                <a:solidFill>
+                  <a:srgbClr val="999999"/>
+                </a:solidFill>
+                <a:effectLst/>
+                <a:latin typeface="Roboto" panose="020F0502020204030204" pitchFamily="34" charset="0"/>
+              </a:rPr>
+              <a:t> and </a:t>
+            </a:r>
+            <a:r>
+              <a:rPr lang="en-US" b="0" i="0" dirty="0" err="1">
+                <a:solidFill>
+                  <a:srgbClr val="999999"/>
+                </a:solidFill>
+                <a:effectLst/>
+                <a:latin typeface="Roboto" panose="020F0502020204030204" pitchFamily="34" charset="0"/>
+              </a:rPr>
+              <a:t>Pythonists</a:t>
+            </a:r>
+            <a:endParaRPr lang="en-US" b="0" i="0" dirty="0">
+              <a:solidFill>
+                <a:srgbClr val="999999"/>
+              </a:solidFill>
+              <a:effectLst/>
+              <a:latin typeface="Roboto" panose="020F0502020204030204" pitchFamily="34" charset="0"/>
+            </a:endParaRPr>
+          </a:p>
+        </p:txBody>
+      </p:sp>
+      <p:sp>
+        <p:nvSpPr>
+          <p:cNvPr id="4" name="Slide Number Placeholder 3"/>
+          <p:cNvSpPr>
+            <a:spLocks noGrp="1"/>
+          </p:cNvSpPr>
+          <p:nvPr>
+            <p:ph type="sldNum" sz="quarter" idx="5"/>
+          </p:nvPr>
+        </p:nvSpPr>
+        <p:spPr/>
+        <p:txBody>
+          <a:bodyPr/>
+          <a:lstStyle/>
+          <a:p>
+            <a:fld id="{5B105CD6-096C-EA40-9B31-0FFB08AC29C0}" type="slidenum">
+              <a:rPr lang="en-US" smtClean="0"/>
+              <a:t>26</a:t>
+            </a:fld>
+            <a:endParaRPr lang="en-US"/>
+          </a:p>
+        </p:txBody>
+      </p:sp>
+    </p:spTree>
+    <p:extLst>
+      <p:ext uri="{BB962C8B-B14F-4D97-AF65-F5344CB8AC3E}">
+        <p14:creationId xmlns:p14="http://schemas.microsoft.com/office/powerpoint/2010/main" val="4201037110"/>
+      </p:ext>
+    </p:extLst>
+  </p:cSld>
+  <p:clrMapOvr>
+    <a:masterClrMapping/>
+  </p:clrMapOvr>
+</p:notes>
+</file>
+
+<file path=ppt/notesSlides/notesSlide25.xml><?xml version="1.0" encoding="utf-8"?>
+<p:notes xmlns:a="http://schemas.openxmlformats.org/drawingml/2006/main" xmlns:r="http://schemas.openxmlformats.org/officeDocument/2006/relationships" xmlns:p="http://schemas.openxmlformats.org/presentationml/2006/main">
+  <p:cSld>
+    <p:spTree>
+      <p:nvGrpSpPr>
+        <p:cNvPr id="1" name=""/>
+        <p:cNvGrpSpPr/>
+        <p:nvPr/>
+      </p:nvGrpSpPr>
+      <p:grpSpPr>
+        <a:xfrm>
+          <a:off x="0" y="0"/>
+          <a:ext cx="0" cy="0"/>
+          <a:chOff x="0" y="0"/>
+          <a:chExt cx="0" cy="0"/>
+        </a:xfrm>
+      </p:grpSpPr>
+      <p:sp>
+        <p:nvSpPr>
+          <p:cNvPr id="2" name="Slide Image Placeholder 1"/>
+          <p:cNvSpPr>
+            <a:spLocks noGrp="1" noRot="1" noChangeAspect="1"/>
+          </p:cNvSpPr>
+          <p:nvPr>
+            <p:ph type="sldImg"/>
+          </p:nvPr>
+        </p:nvSpPr>
+        <p:spPr/>
+      </p:sp>
+      <p:sp>
+        <p:nvSpPr>
+          <p:cNvPr id="3" name="Notes Placeholder 2"/>
+          <p:cNvSpPr>
+            <a:spLocks noGrp="1"/>
+          </p:cNvSpPr>
+          <p:nvPr>
+            <p:ph type="body" idx="1"/>
+          </p:nvPr>
+        </p:nvSpPr>
+        <p:spPr/>
+        <p:txBody>
+          <a:bodyPr/>
+          <a:lstStyle/>
+          <a:p>
+            <a:endParaRPr lang="en-US" b="0" i="0" dirty="0">
+              <a:solidFill>
+                <a:srgbClr val="999999"/>
+              </a:solidFill>
+              <a:effectLst/>
+              <a:latin typeface="Roboto" panose="020F0502020204030204" pitchFamily="34" charset="0"/>
+            </a:endParaRPr>
+          </a:p>
+        </p:txBody>
+      </p:sp>
+      <p:sp>
+        <p:nvSpPr>
+          <p:cNvPr id="4" name="Slide Number Placeholder 3"/>
+          <p:cNvSpPr>
+            <a:spLocks noGrp="1"/>
+          </p:cNvSpPr>
+          <p:nvPr>
+            <p:ph type="sldNum" sz="quarter" idx="5"/>
+          </p:nvPr>
+        </p:nvSpPr>
+        <p:spPr/>
+        <p:txBody>
+          <a:bodyPr/>
+          <a:lstStyle/>
+          <a:p>
+            <a:fld id="{5B105CD6-096C-EA40-9B31-0FFB08AC29C0}" type="slidenum">
+              <a:rPr lang="en-US" smtClean="0"/>
+              <a:t>27</a:t>
+            </a:fld>
+            <a:endParaRPr lang="en-US"/>
+          </a:p>
+        </p:txBody>
+      </p:sp>
+    </p:spTree>
+    <p:extLst>
+      <p:ext uri="{BB962C8B-B14F-4D97-AF65-F5344CB8AC3E}">
+        <p14:creationId xmlns:p14="http://schemas.microsoft.com/office/powerpoint/2010/main" val="1063179337"/>
+      </p:ext>
+    </p:extLst>
+  </p:cSld>
+  <p:clrMapOvr>
+    <a:masterClrMapping/>
+  </p:clrMapOvr>
+</p:notes>
+</file>
+
+<file path=ppt/notesSlides/notesSlide26.xml><?xml version="1.0" encoding="utf-8"?>
+<p:notes xmlns:a="http://schemas.openxmlformats.org/drawingml/2006/main" xmlns:r="http://schemas.openxmlformats.org/officeDocument/2006/relationships" xmlns:p="http://schemas.openxmlformats.org/presentationml/2006/main">
+  <p:cSld>
+    <p:spTree>
+      <p:nvGrpSpPr>
+        <p:cNvPr id="1" name=""/>
+        <p:cNvGrpSpPr/>
+        <p:nvPr/>
+      </p:nvGrpSpPr>
+      <p:grpSpPr>
+        <a:xfrm>
+          <a:off x="0" y="0"/>
+          <a:ext cx="0" cy="0"/>
+          <a:chOff x="0" y="0"/>
+          <a:chExt cx="0" cy="0"/>
+        </a:xfrm>
+      </p:grpSpPr>
+      <p:sp>
+        <p:nvSpPr>
+          <p:cNvPr id="2" name="Slide Image Placeholder 1"/>
+          <p:cNvSpPr>
+            <a:spLocks noGrp="1" noRot="1" noChangeAspect="1"/>
+          </p:cNvSpPr>
+          <p:nvPr>
+            <p:ph type="sldImg"/>
+          </p:nvPr>
+        </p:nvSpPr>
+        <p:spPr/>
+      </p:sp>
+      <p:sp>
+        <p:nvSpPr>
+          <p:cNvPr id="3" name="Notes Placeholder 2"/>
+          <p:cNvSpPr>
+            <a:spLocks noGrp="1"/>
+          </p:cNvSpPr>
+          <p:nvPr>
+            <p:ph type="body" idx="1"/>
+          </p:nvPr>
+        </p:nvSpPr>
+        <p:spPr/>
+        <p:txBody>
+          <a:bodyPr/>
+          <a:lstStyle/>
+          <a:p>
+            <a:endParaRPr lang="en-US" b="0" i="0" dirty="0">
+              <a:solidFill>
+                <a:srgbClr val="999999"/>
+              </a:solidFill>
+              <a:effectLst/>
+              <a:latin typeface="Roboto" panose="020F0502020204030204" pitchFamily="34" charset="0"/>
+            </a:endParaRPr>
+          </a:p>
+        </p:txBody>
+      </p:sp>
+      <p:sp>
+        <p:nvSpPr>
+          <p:cNvPr id="4" name="Slide Number Placeholder 3"/>
+          <p:cNvSpPr>
+            <a:spLocks noGrp="1"/>
+          </p:cNvSpPr>
+          <p:nvPr>
+            <p:ph type="sldNum" sz="quarter" idx="5"/>
+          </p:nvPr>
+        </p:nvSpPr>
+        <p:spPr/>
+        <p:txBody>
+          <a:bodyPr/>
+          <a:lstStyle/>
+          <a:p>
+            <a:fld id="{5B105CD6-096C-EA40-9B31-0FFB08AC29C0}" type="slidenum">
+              <a:rPr lang="en-US" smtClean="0"/>
+              <a:t>28</a:t>
+            </a:fld>
+            <a:endParaRPr lang="en-US"/>
+          </a:p>
+        </p:txBody>
+      </p:sp>
+    </p:spTree>
+    <p:extLst>
+      <p:ext uri="{BB962C8B-B14F-4D97-AF65-F5344CB8AC3E}">
+        <p14:creationId xmlns:p14="http://schemas.microsoft.com/office/powerpoint/2010/main" val="2477408428"/>
+      </p:ext>
+    </p:extLst>
+  </p:cSld>
+  <p:clrMapOvr>
+    <a:masterClrMapping/>
+  </p:clrMapOvr>
+</p:notes>
+</file>
+
+<file path=ppt/notesSlides/notesSlide27.xml><?xml version="1.0" encoding="utf-8"?>
+<p:notes xmlns:a="http://schemas.openxmlformats.org/drawingml/2006/main" xmlns:r="http://schemas.openxmlformats.org/officeDocument/2006/relationships" xmlns:p="http://schemas.openxmlformats.org/presentationml/2006/main">
+  <p:cSld>
+    <p:spTree>
+      <p:nvGrpSpPr>
+        <p:cNvPr id="1" name=""/>
+        <p:cNvGrpSpPr/>
+        <p:nvPr/>
+      </p:nvGrpSpPr>
+      <p:grpSpPr>
+        <a:xfrm>
+          <a:off x="0" y="0"/>
+          <a:ext cx="0" cy="0"/>
+          <a:chOff x="0" y="0"/>
+          <a:chExt cx="0" cy="0"/>
+        </a:xfrm>
+      </p:grpSpPr>
+      <p:sp>
+        <p:nvSpPr>
+          <p:cNvPr id="2" name="Slide Image Placeholder 1"/>
+          <p:cNvSpPr>
+            <a:spLocks noGrp="1" noRot="1" noChangeAspect="1"/>
+          </p:cNvSpPr>
+          <p:nvPr>
+            <p:ph type="sldImg"/>
+          </p:nvPr>
+        </p:nvSpPr>
+        <p:spPr/>
+      </p:sp>
+      <p:sp>
+        <p:nvSpPr>
+          <p:cNvPr id="3" name="Notes Placeholder 2"/>
+          <p:cNvSpPr>
+            <a:spLocks noGrp="1"/>
+          </p:cNvSpPr>
+          <p:nvPr>
+            <p:ph type="body" idx="1"/>
+          </p:nvPr>
+        </p:nvSpPr>
+        <p:spPr/>
+        <p:txBody>
+          <a:bodyPr/>
+          <a:lstStyle/>
+          <a:p>
+            <a:endParaRPr lang="en-US" b="0" i="0" dirty="0">
+              <a:solidFill>
+                <a:srgbClr val="999999"/>
+              </a:solidFill>
+              <a:effectLst/>
+              <a:latin typeface="Roboto" panose="020F0502020204030204" pitchFamily="34" charset="0"/>
+            </a:endParaRPr>
+          </a:p>
+        </p:txBody>
+      </p:sp>
+      <p:sp>
+        <p:nvSpPr>
+          <p:cNvPr id="4" name="Slide Number Placeholder 3"/>
+          <p:cNvSpPr>
+            <a:spLocks noGrp="1"/>
+          </p:cNvSpPr>
+          <p:nvPr>
+            <p:ph type="sldNum" sz="quarter" idx="5"/>
+          </p:nvPr>
+        </p:nvSpPr>
+        <p:spPr/>
+        <p:txBody>
+          <a:bodyPr/>
+          <a:lstStyle/>
+          <a:p>
+            <a:fld id="{5B105CD6-096C-EA40-9B31-0FFB08AC29C0}" type="slidenum">
+              <a:rPr lang="en-US" smtClean="0"/>
+              <a:t>29</a:t>
+            </a:fld>
+            <a:endParaRPr lang="en-US"/>
+          </a:p>
+        </p:txBody>
+      </p:sp>
+    </p:spTree>
+    <p:extLst>
+      <p:ext uri="{BB962C8B-B14F-4D97-AF65-F5344CB8AC3E}">
+        <p14:creationId xmlns:p14="http://schemas.microsoft.com/office/powerpoint/2010/main" val="1899714695"/>
+      </p:ext>
+    </p:extLst>
+  </p:cSld>
+  <p:clrMapOvr>
+    <a:masterClrMapping/>
+  </p:clrMapOvr>
+</p:notes>
+</file>
+
+<file path=ppt/notesSlides/notesSlide28.xml><?xml version="1.0" encoding="utf-8"?>
+<p:notes xmlns:a="http://schemas.openxmlformats.org/drawingml/2006/main" xmlns:r="http://schemas.openxmlformats.org/officeDocument/2006/relationships" xmlns:p="http://schemas.openxmlformats.org/presentationml/2006/main">
+  <p:cSld>
+    <p:spTree>
+      <p:nvGrpSpPr>
+        <p:cNvPr id="1" name=""/>
+        <p:cNvGrpSpPr/>
+        <p:nvPr/>
+      </p:nvGrpSpPr>
+      <p:grpSpPr>
+        <a:xfrm>
+          <a:off x="0" y="0"/>
+          <a:ext cx="0" cy="0"/>
+          <a:chOff x="0" y="0"/>
+          <a:chExt cx="0" cy="0"/>
+        </a:xfrm>
+      </p:grpSpPr>
+      <p:sp>
+        <p:nvSpPr>
+          <p:cNvPr id="2" name="Slide Image Placeholder 1"/>
+          <p:cNvSpPr>
+            <a:spLocks noGrp="1" noRot="1" noChangeAspect="1"/>
+          </p:cNvSpPr>
+          <p:nvPr>
+            <p:ph type="sldImg"/>
+          </p:nvPr>
+        </p:nvSpPr>
+        <p:spPr/>
+      </p:sp>
+      <p:sp>
+        <p:nvSpPr>
+          <p:cNvPr id="3" name="Notes Placeholder 2"/>
+          <p:cNvSpPr>
+            <a:spLocks noGrp="1"/>
+          </p:cNvSpPr>
+          <p:nvPr>
+            <p:ph type="body" idx="1"/>
+          </p:nvPr>
+        </p:nvSpPr>
+        <p:spPr/>
+        <p:txBody>
+          <a:bodyPr/>
+          <a:lstStyle/>
+          <a:p>
+            <a:endParaRPr lang="en-US" b="0" i="0" dirty="0">
+              <a:solidFill>
+                <a:srgbClr val="999999"/>
+              </a:solidFill>
+              <a:effectLst/>
+              <a:latin typeface="Roboto" panose="020F0502020204030204" pitchFamily="34" charset="0"/>
+            </a:endParaRPr>
+          </a:p>
+        </p:txBody>
+      </p:sp>
+      <p:sp>
+        <p:nvSpPr>
+          <p:cNvPr id="4" name="Slide Number Placeholder 3"/>
+          <p:cNvSpPr>
+            <a:spLocks noGrp="1"/>
+          </p:cNvSpPr>
+          <p:nvPr>
+            <p:ph type="sldNum" sz="quarter" idx="5"/>
+          </p:nvPr>
+        </p:nvSpPr>
+        <p:spPr/>
+        <p:txBody>
+          <a:bodyPr/>
+          <a:lstStyle/>
+          <a:p>
+            <a:fld id="{5B105CD6-096C-EA40-9B31-0FFB08AC29C0}" type="slidenum">
+              <a:rPr lang="en-US" smtClean="0"/>
+              <a:t>30</a:t>
+            </a:fld>
+            <a:endParaRPr lang="en-US"/>
+          </a:p>
+        </p:txBody>
+      </p:sp>
+    </p:spTree>
+    <p:extLst>
+      <p:ext uri="{BB962C8B-B14F-4D97-AF65-F5344CB8AC3E}">
+        <p14:creationId xmlns:p14="http://schemas.microsoft.com/office/powerpoint/2010/main" val="3588741909"/>
+      </p:ext>
+    </p:extLst>
+  </p:cSld>
+  <p:clrMapOvr>
+    <a:masterClrMapping/>
+  </p:clrMapOvr>
+</p:notes>
+</file>
+
+<file path=ppt/notesSlides/notesSlide29.xml><?xml version="1.0" encoding="utf-8"?>
+<p:notes xmlns:a="http://schemas.openxmlformats.org/drawingml/2006/main" xmlns:r="http://schemas.openxmlformats.org/officeDocument/2006/relationships" xmlns:p="http://schemas.openxmlformats.org/presentationml/2006/main">
+  <p:cSld>
+    <p:spTree>
+      <p:nvGrpSpPr>
+        <p:cNvPr id="1" name=""/>
+        <p:cNvGrpSpPr/>
+        <p:nvPr/>
+      </p:nvGrpSpPr>
+      <p:grpSpPr>
+        <a:xfrm>
+          <a:off x="0" y="0"/>
+          <a:ext cx="0" cy="0"/>
+          <a:chOff x="0" y="0"/>
+          <a:chExt cx="0" cy="0"/>
+        </a:xfrm>
+      </p:grpSpPr>
+      <p:sp>
+        <p:nvSpPr>
+          <p:cNvPr id="2" name="Slide Image Placeholder 1"/>
+          <p:cNvSpPr>
+            <a:spLocks noGrp="1" noRot="1" noChangeAspect="1"/>
+          </p:cNvSpPr>
+          <p:nvPr>
+            <p:ph type="sldImg"/>
+          </p:nvPr>
+        </p:nvSpPr>
+        <p:spPr/>
+      </p:sp>
+      <p:sp>
+        <p:nvSpPr>
+          <p:cNvPr id="3" name="Notes Placeholder 2"/>
+          <p:cNvSpPr>
+            <a:spLocks noGrp="1"/>
+          </p:cNvSpPr>
+          <p:nvPr>
+            <p:ph type="body" idx="1"/>
+          </p:nvPr>
+        </p:nvSpPr>
+        <p:spPr/>
+        <p:txBody>
+          <a:bodyPr/>
+          <a:lstStyle/>
+          <a:p>
+            <a:r>
+              <a:rPr lang="en-US" b="0" i="0" dirty="0">
+                <a:solidFill>
+                  <a:srgbClr val="999999"/>
+                </a:solidFill>
+                <a:effectLst/>
+                <a:latin typeface="Roboto" panose="020F0502020204030204" pitchFamily="34" charset="0"/>
+              </a:rPr>
+              <a:t>So when you go to look for a ticket to take, remember that there is an amazing community here that wants to see you succeed … and at the end of the day</a:t>
+            </a:r>
+          </a:p>
+        </p:txBody>
+      </p:sp>
+      <p:sp>
+        <p:nvSpPr>
+          <p:cNvPr id="4" name="Slide Number Placeholder 3"/>
+          <p:cNvSpPr>
+            <a:spLocks noGrp="1"/>
+          </p:cNvSpPr>
+          <p:nvPr>
+            <p:ph type="sldNum" sz="quarter" idx="5"/>
+          </p:nvPr>
+        </p:nvSpPr>
+        <p:spPr/>
+        <p:txBody>
+          <a:bodyPr/>
+          <a:lstStyle/>
+          <a:p>
+            <a:fld id="{5B105CD6-096C-EA40-9B31-0FFB08AC29C0}" type="slidenum">
+              <a:rPr lang="en-US" smtClean="0"/>
+              <a:t>31</a:t>
+            </a:fld>
+            <a:endParaRPr lang="en-US"/>
+          </a:p>
+        </p:txBody>
+      </p:sp>
+    </p:spTree>
+    <p:extLst>
+      <p:ext uri="{BB962C8B-B14F-4D97-AF65-F5344CB8AC3E}">
+        <p14:creationId xmlns:p14="http://schemas.microsoft.com/office/powerpoint/2010/main" val="1884065224"/>
+      </p:ext>
+    </p:extLst>
+  </p:cSld>
+  <p:clrMapOvr>
+    <a:masterClrMapping/>
+  </p:clrMapOvr>
+</p:notes>
+</file>
+
 <file path=ppt/notesSlides/notesSlide3.xml><?xml version="1.0" encoding="utf-8"?>
 <p:notes xmlns:a="http://schemas.openxmlformats.org/drawingml/2006/main" xmlns:r="http://schemas.openxmlformats.org/officeDocument/2006/relationships" xmlns:p="http://schemas.openxmlformats.org/presentationml/2006/main">
   <p:cSld>
@@ -1102,6 +3480,189 @@
     <p:extLst>
       <p:ext uri="{BB962C8B-B14F-4D97-AF65-F5344CB8AC3E}">
         <p14:creationId xmlns:p14="http://schemas.microsoft.com/office/powerpoint/2010/main" val="2238158439"/>
+      </p:ext>
+    </p:extLst>
+  </p:cSld>
+  <p:clrMapOvr>
+    <a:masterClrMapping/>
+  </p:clrMapOvr>
+</p:notes>
+</file>
+
+<file path=ppt/notesSlides/notesSlide30.xml><?xml version="1.0" encoding="utf-8"?>
+<p:notes xmlns:a="http://schemas.openxmlformats.org/drawingml/2006/main" xmlns:r="http://schemas.openxmlformats.org/officeDocument/2006/relationships" xmlns:p="http://schemas.openxmlformats.org/presentationml/2006/main">
+  <p:cSld>
+    <p:spTree>
+      <p:nvGrpSpPr>
+        <p:cNvPr id="1" name=""/>
+        <p:cNvGrpSpPr/>
+        <p:nvPr/>
+      </p:nvGrpSpPr>
+      <p:grpSpPr>
+        <a:xfrm>
+          <a:off x="0" y="0"/>
+          <a:ext cx="0" cy="0"/>
+          <a:chOff x="0" y="0"/>
+          <a:chExt cx="0" cy="0"/>
+        </a:xfrm>
+      </p:grpSpPr>
+      <p:sp>
+        <p:nvSpPr>
+          <p:cNvPr id="2" name="Slide Image Placeholder 1"/>
+          <p:cNvSpPr>
+            <a:spLocks noGrp="1" noRot="1" noChangeAspect="1"/>
+          </p:cNvSpPr>
+          <p:nvPr>
+            <p:ph type="sldImg"/>
+          </p:nvPr>
+        </p:nvSpPr>
+        <p:spPr/>
+      </p:sp>
+      <p:sp>
+        <p:nvSpPr>
+          <p:cNvPr id="3" name="Notes Placeholder 2"/>
+          <p:cNvSpPr>
+            <a:spLocks noGrp="1"/>
+          </p:cNvSpPr>
+          <p:nvPr>
+            <p:ph type="body" idx="1"/>
+          </p:nvPr>
+        </p:nvSpPr>
+        <p:spPr/>
+        <p:txBody>
+          <a:bodyPr/>
+          <a:lstStyle/>
+          <a:p>
+            <a:endParaRPr lang="en-US" b="0" i="0" dirty="0">
+              <a:solidFill>
+                <a:srgbClr val="999999"/>
+              </a:solidFill>
+              <a:effectLst/>
+              <a:latin typeface="Roboto" panose="020F0502020204030204" pitchFamily="34" charset="0"/>
+            </a:endParaRPr>
+          </a:p>
+        </p:txBody>
+      </p:sp>
+      <p:sp>
+        <p:nvSpPr>
+          <p:cNvPr id="4" name="Slide Number Placeholder 3"/>
+          <p:cNvSpPr>
+            <a:spLocks noGrp="1"/>
+          </p:cNvSpPr>
+          <p:nvPr>
+            <p:ph type="sldNum" sz="quarter" idx="5"/>
+          </p:nvPr>
+        </p:nvSpPr>
+        <p:spPr/>
+        <p:txBody>
+          <a:bodyPr/>
+          <a:lstStyle/>
+          <a:p>
+            <a:fld id="{5B105CD6-096C-EA40-9B31-0FFB08AC29C0}" type="slidenum">
+              <a:rPr lang="en-US" smtClean="0"/>
+              <a:t>32</a:t>
+            </a:fld>
+            <a:endParaRPr lang="en-US"/>
+          </a:p>
+        </p:txBody>
+      </p:sp>
+    </p:spTree>
+    <p:extLst>
+      <p:ext uri="{BB962C8B-B14F-4D97-AF65-F5344CB8AC3E}">
+        <p14:creationId xmlns:p14="http://schemas.microsoft.com/office/powerpoint/2010/main" val="3165730178"/>
+      </p:ext>
+    </p:extLst>
+  </p:cSld>
+  <p:clrMapOvr>
+    <a:masterClrMapping/>
+  </p:clrMapOvr>
+</p:notes>
+</file>
+
+<file path=ppt/notesSlides/notesSlide31.xml><?xml version="1.0" encoding="utf-8"?>
+<p:notes xmlns:a="http://schemas.openxmlformats.org/drawingml/2006/main" xmlns:r="http://schemas.openxmlformats.org/officeDocument/2006/relationships" xmlns:p="http://schemas.openxmlformats.org/presentationml/2006/main">
+  <p:cSld>
+    <p:spTree>
+      <p:nvGrpSpPr>
+        <p:cNvPr id="1" name=""/>
+        <p:cNvGrpSpPr/>
+        <p:nvPr/>
+      </p:nvGrpSpPr>
+      <p:grpSpPr>
+        <a:xfrm>
+          <a:off x="0" y="0"/>
+          <a:ext cx="0" cy="0"/>
+          <a:chOff x="0" y="0"/>
+          <a:chExt cx="0" cy="0"/>
+        </a:xfrm>
+      </p:grpSpPr>
+      <p:sp>
+        <p:nvSpPr>
+          <p:cNvPr id="2" name="Slide Image Placeholder 1"/>
+          <p:cNvSpPr>
+            <a:spLocks noGrp="1" noRot="1" noChangeAspect="1"/>
+          </p:cNvSpPr>
+          <p:nvPr>
+            <p:ph type="sldImg"/>
+          </p:nvPr>
+        </p:nvSpPr>
+        <p:spPr/>
+      </p:sp>
+      <p:sp>
+        <p:nvSpPr>
+          <p:cNvPr id="3" name="Notes Placeholder 2"/>
+          <p:cNvSpPr>
+            <a:spLocks noGrp="1"/>
+          </p:cNvSpPr>
+          <p:nvPr>
+            <p:ph type="body" idx="1"/>
+          </p:nvPr>
+        </p:nvSpPr>
+        <p:spPr/>
+        <p:txBody>
+          <a:bodyPr/>
+          <a:lstStyle/>
+          <a:p>
+            <a:r>
+              <a:rPr lang="en-US" b="0" i="0" dirty="0">
+                <a:solidFill>
+                  <a:srgbClr val="999999"/>
+                </a:solidFill>
+                <a:effectLst/>
+                <a:latin typeface="Roboto" panose="020F0502020204030204" pitchFamily="34" charset="0"/>
+              </a:rPr>
+              <a:t>So when you’re ready to dive in to one of the currently &lt;&gt; open tickets, just keep that in mind</a:t>
+            </a:r>
+          </a:p>
+        </p:txBody>
+      </p:sp>
+      <p:sp>
+        <p:nvSpPr>
+          <p:cNvPr id="4" name="Slide Number Placeholder 3"/>
+          <p:cNvSpPr>
+            <a:spLocks noGrp="1"/>
+          </p:cNvSpPr>
+          <p:nvPr>
+            <p:ph type="sldNum" sz="quarter" idx="5"/>
+          </p:nvPr>
+        </p:nvSpPr>
+        <p:spPr/>
+        <p:txBody>
+          <a:bodyPr/>
+          <a:lstStyle/>
+          <a:p>
+            <a:fld id="{5B105CD6-096C-EA40-9B31-0FFB08AC29C0}" type="slidenum">
+              <a:rPr lang="en-US" smtClean="0"/>
+              <a:t>33</a:t>
+            </a:fld>
+            <a:endParaRPr lang="en-US"/>
+          </a:p>
+        </p:txBody>
+      </p:sp>
+    </p:spTree>
+    <p:extLst>
+      <p:ext uri="{BB962C8B-B14F-4D97-AF65-F5344CB8AC3E}">
+        <p14:creationId xmlns:p14="http://schemas.microsoft.com/office/powerpoint/2010/main" val="3247473052"/>
       </p:ext>
     </p:extLst>
   </p:cSld>
@@ -1622,7 +4183,69 @@
                 <a:effectLst/>
                 <a:latin typeface="Inconsolata NF Regular" pitchFamily="49" charset="77"/>
               </a:rPr>
-              <a:t>Finding a ticket and picking to work it: 10070</a:t>
+              <a:t>I was very excited about attending the sprints and working on *something* ORM related</a:t>
+            </a:r>
+          </a:p>
+          <a:p>
+            <a:endParaRPr lang="en-US" b="0" dirty="0">
+              <a:solidFill>
+                <a:srgbClr val="CCCCCC"/>
+              </a:solidFill>
+              <a:effectLst/>
+              <a:latin typeface="Inconsolata NF Regular" pitchFamily="49" charset="77"/>
+            </a:endParaRPr>
+          </a:p>
+          <a:p>
+            <a:r>
+              <a:rPr lang="en-US" b="0" dirty="0">
+                <a:solidFill>
+                  <a:srgbClr val="CCCCCC"/>
+                </a:solidFill>
+                <a:effectLst/>
+                <a:latin typeface="Inconsolata NF Regular" pitchFamily="49" charset="77"/>
+              </a:rPr>
+              <a:t>My strategy for finding a ticket was to find something old, that seemed straightforward(</a:t>
+            </a:r>
+            <a:r>
+              <a:rPr lang="en-US" b="0" dirty="0" err="1">
+                <a:solidFill>
+                  <a:srgbClr val="CCCCCC"/>
+                </a:solidFill>
+                <a:effectLst/>
+                <a:latin typeface="Inconsolata NF Regular" pitchFamily="49" charset="77"/>
+              </a:rPr>
+              <a:t>ish</a:t>
+            </a:r>
+            <a:r>
+              <a:rPr lang="en-US" b="0" dirty="0">
+                <a:solidFill>
+                  <a:srgbClr val="CCCCCC"/>
+                </a:solidFill>
+                <a:effectLst/>
+                <a:latin typeface="Inconsolata NF Regular" pitchFamily="49" charset="77"/>
+              </a:rPr>
+              <a:t>) and then just go for it. </a:t>
+            </a:r>
+          </a:p>
+          <a:p>
+            <a:endParaRPr lang="en-US" b="0" dirty="0">
+              <a:solidFill>
+                <a:srgbClr val="CCCCCC"/>
+              </a:solidFill>
+              <a:effectLst/>
+              <a:latin typeface="Inconsolata NF Regular" pitchFamily="49" charset="77"/>
+            </a:endParaRPr>
+          </a:p>
+          <a:p>
+            <a:r>
+              <a:rPr lang="en-US" b="0" dirty="0">
+                <a:solidFill>
+                  <a:srgbClr val="CCCCCC"/>
+                </a:solidFill>
+                <a:effectLst/>
+                <a:latin typeface="Inconsolata NF Regular" pitchFamily="49" charset="77"/>
+              </a:rPr>
+              <a:t>After about 15 minutes of looking around I finally settled on</a:t>
             </a:r>
           </a:p>
         </p:txBody>
@@ -1810,7 +4433,7 @@
           <a:p>
             <a:fld id="{B6B3B492-DC57-8244-BCF3-2288DCC53F2C}" type="datetimeFigureOut">
               <a:rPr lang="en-US" smtClean="0"/>
-              <a:t>7/27/23</a:t>
+              <a:t>7/29/23</a:t>
             </a:fld>
             <a:endParaRPr lang="en-US"/>
           </a:p>
@@ -2008,7 +4631,7 @@
           <a:p>
             <a:fld id="{B6B3B492-DC57-8244-BCF3-2288DCC53F2C}" type="datetimeFigureOut">
               <a:rPr lang="en-US" smtClean="0"/>
-              <a:t>7/27/23</a:t>
+              <a:t>7/29/23</a:t>
             </a:fld>
             <a:endParaRPr lang="en-US"/>
           </a:p>
@@ -2216,7 +4839,7 @@
           <a:p>
             <a:fld id="{B6B3B492-DC57-8244-BCF3-2288DCC53F2C}" type="datetimeFigureOut">
               <a:rPr lang="en-US" smtClean="0"/>
-              <a:t>7/27/23</a:t>
+              <a:t>7/29/23</a:t>
             </a:fld>
             <a:endParaRPr lang="en-US"/>
           </a:p>
@@ -2414,7 +5037,7 @@
           <a:p>
             <a:fld id="{B6B3B492-DC57-8244-BCF3-2288DCC53F2C}" type="datetimeFigureOut">
               <a:rPr lang="en-US" smtClean="0"/>
-              <a:t>7/27/23</a:t>
+              <a:t>7/29/23</a:t>
             </a:fld>
             <a:endParaRPr lang="en-US"/>
           </a:p>
@@ -2689,7 +5312,7 @@
           <a:p>
             <a:fld id="{B6B3B492-DC57-8244-BCF3-2288DCC53F2C}" type="datetimeFigureOut">
               <a:rPr lang="en-US" smtClean="0"/>
-              <a:t>7/27/23</a:t>
+              <a:t>7/29/23</a:t>
             </a:fld>
             <a:endParaRPr lang="en-US"/>
           </a:p>
@@ -2954,7 +5577,7 @@
           <a:p>
             <a:fld id="{B6B3B492-DC57-8244-BCF3-2288DCC53F2C}" type="datetimeFigureOut">
               <a:rPr lang="en-US" smtClean="0"/>
-              <a:t>7/27/23</a:t>
+              <a:t>7/29/23</a:t>
             </a:fld>
             <a:endParaRPr lang="en-US"/>
           </a:p>
@@ -3366,7 +5989,7 @@
           <a:p>
             <a:fld id="{B6B3B492-DC57-8244-BCF3-2288DCC53F2C}" type="datetimeFigureOut">
               <a:rPr lang="en-US" smtClean="0"/>
-              <a:t>7/27/23</a:t>
+              <a:t>7/29/23</a:t>
             </a:fld>
             <a:endParaRPr lang="en-US"/>
           </a:p>
@@ -3507,7 +6130,7 @@
           <a:p>
             <a:fld id="{B6B3B492-DC57-8244-BCF3-2288DCC53F2C}" type="datetimeFigureOut">
               <a:rPr lang="en-US" smtClean="0"/>
-              <a:t>7/27/23</a:t>
+              <a:t>7/29/23</a:t>
             </a:fld>
             <a:endParaRPr lang="en-US"/>
           </a:p>
@@ -3620,7 +6243,7 @@
           <a:p>
             <a:fld id="{B6B3B492-DC57-8244-BCF3-2288DCC53F2C}" type="datetimeFigureOut">
               <a:rPr lang="en-US" smtClean="0"/>
-              <a:t>7/27/23</a:t>
+              <a:t>7/29/23</a:t>
             </a:fld>
             <a:endParaRPr lang="en-US"/>
           </a:p>
@@ -3931,7 +6554,7 @@
           <a:p>
             <a:fld id="{B6B3B492-DC57-8244-BCF3-2288DCC53F2C}" type="datetimeFigureOut">
               <a:rPr lang="en-US" smtClean="0"/>
-              <a:t>7/27/23</a:t>
+              <a:t>7/29/23</a:t>
             </a:fld>
             <a:endParaRPr lang="en-US"/>
           </a:p>
@@ -4219,7 +6842,7 @@
           <a:p>
             <a:fld id="{B6B3B492-DC57-8244-BCF3-2288DCC53F2C}" type="datetimeFigureOut">
               <a:rPr lang="en-US" smtClean="0"/>
-              <a:t>7/27/23</a:t>
+              <a:t>7/29/23</a:t>
             </a:fld>
             <a:endParaRPr lang="en-US"/>
           </a:p>
@@ -4460,7 +7083,7 @@
           <a:p>
             <a:fld id="{B6B3B492-DC57-8244-BCF3-2288DCC53F2C}" type="datetimeFigureOut">
               <a:rPr lang="en-US" smtClean="0"/>
-              <a:t>7/27/23</a:t>
+              <a:t>7/29/23</a:t>
             </a:fld>
             <a:endParaRPr lang="en-US"/>
           </a:p>
@@ -5068,77 +7691,6 @@
           <a:chExt cx="0" cy="0"/>
         </a:xfrm>
       </p:grpSpPr>
-      <p:sp>
-        <p:nvSpPr>
-          <p:cNvPr id="4" name="Title 3">
-            <a:extLst>
-              <a:ext uri="{FF2B5EF4-FFF2-40B4-BE49-F238E27FC236}">
-                <a16:creationId xmlns:a16="http://schemas.microsoft.com/office/drawing/2014/main" id="{4EC330F1-2E50-8B47-1D7A-DC1887E3FA13}"/>
-              </a:ext>
-            </a:extLst>
-          </p:cNvPr>
-          <p:cNvSpPr>
-            <a:spLocks noGrp="1"/>
-          </p:cNvSpPr>
-          <p:nvPr>
-            <p:ph type="title"/>
-          </p:nvPr>
-        </p:nvSpPr>
-        <p:spPr>
-          <a:xfrm>
-            <a:off x="838200" y="2621629"/>
-            <a:ext cx="10515600" cy="1325563"/>
-          </a:xfrm>
-        </p:spPr>
-        <p:txBody>
-          <a:bodyPr/>
-          <a:lstStyle/>
-          <a:p>
-            <a:pPr algn="ctr"/>
-            <a:r>
-              <a:rPr lang="en-US" b="1" dirty="0">
-                <a:solidFill>
-                  <a:srgbClr val="569CD6"/>
-                </a:solidFill>
-                <a:effectLst/>
-                <a:latin typeface="Inconsolata NF Regular" pitchFamily="49" charset="77"/>
-              </a:rPr>
-              <a:t>Ticket 10070</a:t>
-            </a:r>
-            <a:endParaRPr lang="en-US" dirty="0"/>
-          </a:p>
-        </p:txBody>
-      </p:sp>
-    </p:spTree>
-    <p:extLst>
-      <p:ext uri="{BB962C8B-B14F-4D97-AF65-F5344CB8AC3E}">
-        <p14:creationId xmlns:p14="http://schemas.microsoft.com/office/powerpoint/2010/main" val="1299242926"/>
-      </p:ext>
-    </p:extLst>
-  </p:cSld>
-  <p:clrMapOvr>
-    <a:masterClrMapping/>
-  </p:clrMapOvr>
-</p:sld>
-</file>
-
-<file path=ppt/slides/slide12.xml><?xml version="1.0" encoding="utf-8"?>
-<p:sld xmlns:a="http://schemas.openxmlformats.org/drawingml/2006/main" xmlns:r="http://schemas.openxmlformats.org/officeDocument/2006/relationships" xmlns:p="http://schemas.openxmlformats.org/presentationml/2006/main">
-  <p:cSld>
-    <p:spTree>
-      <p:nvGrpSpPr>
-        <p:cNvPr id="1" name=""/>
-        <p:cNvGrpSpPr/>
-        <p:nvPr/>
-      </p:nvGrpSpPr>
-      <p:grpSpPr>
-        <a:xfrm>
-          <a:off x="0" y="0"/>
-          <a:ext cx="0" cy="0"/>
-          <a:chOff x="0" y="0"/>
-          <a:chExt cx="0" cy="0"/>
-        </a:xfrm>
-      </p:grpSpPr>
       <p:pic>
         <p:nvPicPr>
           <p:cNvPr id="3" name="Picture 2">
@@ -5154,7 +7706,7 @@
           <p:nvPr/>
         </p:nvPicPr>
         <p:blipFill>
-          <a:blip r:embed="rId2"/>
+          <a:blip r:embed="rId3"/>
           <a:stretch>
             <a:fillRect/>
           </a:stretch>
@@ -5182,6 +7734,593 @@
 </p:sld>
 </file>
 
+<file path=ppt/slides/slide12.xml><?xml version="1.0" encoding="utf-8"?>
+<p:sld xmlns:a="http://schemas.openxmlformats.org/drawingml/2006/main" xmlns:r="http://schemas.openxmlformats.org/officeDocument/2006/relationships" xmlns:p="http://schemas.openxmlformats.org/presentationml/2006/main">
+  <p:cSld>
+    <p:spTree>
+      <p:nvGrpSpPr>
+        <p:cNvPr id="1" name=""/>
+        <p:cNvGrpSpPr/>
+        <p:nvPr/>
+      </p:nvGrpSpPr>
+      <p:grpSpPr>
+        <a:xfrm>
+          <a:off x="0" y="0"/>
+          <a:ext cx="0" cy="0"/>
+          <a:chOff x="0" y="0"/>
+          <a:chExt cx="0" cy="0"/>
+        </a:xfrm>
+      </p:grpSpPr>
+      <p:sp>
+        <p:nvSpPr>
+          <p:cNvPr id="4" name="Title 3">
+            <a:extLst>
+              <a:ext uri="{FF2B5EF4-FFF2-40B4-BE49-F238E27FC236}">
+                <a16:creationId xmlns:a16="http://schemas.microsoft.com/office/drawing/2014/main" id="{4EC330F1-2E50-8B47-1D7A-DC1887E3FA13}"/>
+              </a:ext>
+            </a:extLst>
+          </p:cNvPr>
+          <p:cNvSpPr>
+            <a:spLocks noGrp="1"/>
+          </p:cNvSpPr>
+          <p:nvPr>
+            <p:ph type="title"/>
+          </p:nvPr>
+        </p:nvSpPr>
+        <p:spPr>
+          <a:xfrm>
+            <a:off x="838200" y="2621629"/>
+            <a:ext cx="10515600" cy="1325563"/>
+          </a:xfrm>
+        </p:spPr>
+        <p:txBody>
+          <a:bodyPr/>
+          <a:lstStyle/>
+          <a:p>
+            <a:pPr algn="ctr"/>
+            <a:r>
+              <a:rPr lang="en-US" b="1" dirty="0">
+                <a:solidFill>
+                  <a:srgbClr val="569CD6"/>
+                </a:solidFill>
+                <a:effectLst/>
+                <a:latin typeface="Inconsolata NF Regular" pitchFamily="49" charset="77"/>
+              </a:rPr>
+              <a:t>Reviewing the Ticket</a:t>
+            </a:r>
+            <a:endParaRPr lang="en-US" dirty="0"/>
+          </a:p>
+        </p:txBody>
+      </p:sp>
+    </p:spTree>
+    <p:extLst>
+      <p:ext uri="{BB962C8B-B14F-4D97-AF65-F5344CB8AC3E}">
+        <p14:creationId xmlns:p14="http://schemas.microsoft.com/office/powerpoint/2010/main" val="4086966955"/>
+      </p:ext>
+    </p:extLst>
+  </p:cSld>
+  <p:clrMapOvr>
+    <a:masterClrMapping/>
+  </p:clrMapOvr>
+</p:sld>
+</file>
+
+<file path=ppt/slides/slide13.xml><?xml version="1.0" encoding="utf-8"?>
+<p:sld xmlns:a="http://schemas.openxmlformats.org/drawingml/2006/main" xmlns:r="http://schemas.openxmlformats.org/officeDocument/2006/relationships" xmlns:p="http://schemas.openxmlformats.org/presentationml/2006/main">
+  <p:cSld>
+    <p:spTree>
+      <p:nvGrpSpPr>
+        <p:cNvPr id="1" name=""/>
+        <p:cNvGrpSpPr/>
+        <p:nvPr/>
+      </p:nvGrpSpPr>
+      <p:grpSpPr>
+        <a:xfrm>
+          <a:off x="0" y="0"/>
+          <a:ext cx="0" cy="0"/>
+          <a:chOff x="0" y="0"/>
+          <a:chExt cx="0" cy="0"/>
+        </a:xfrm>
+      </p:grpSpPr>
+      <p:sp>
+        <p:nvSpPr>
+          <p:cNvPr id="4" name="Title 3">
+            <a:extLst>
+              <a:ext uri="{FF2B5EF4-FFF2-40B4-BE49-F238E27FC236}">
+                <a16:creationId xmlns:a16="http://schemas.microsoft.com/office/drawing/2014/main" id="{4EC330F1-2E50-8B47-1D7A-DC1887E3FA13}"/>
+              </a:ext>
+            </a:extLst>
+          </p:cNvPr>
+          <p:cNvSpPr>
+            <a:spLocks noGrp="1"/>
+          </p:cNvSpPr>
+          <p:nvPr>
+            <p:ph type="title"/>
+          </p:nvPr>
+        </p:nvSpPr>
+        <p:spPr>
+          <a:xfrm>
+            <a:off x="838200" y="2621629"/>
+            <a:ext cx="10515600" cy="2584552"/>
+          </a:xfrm>
+        </p:spPr>
+        <p:txBody>
+          <a:bodyPr>
+            <a:normAutofit fontScale="90000"/>
+          </a:bodyPr>
+          <a:lstStyle/>
+          <a:p>
+            <a:pPr algn="ctr"/>
+            <a:r>
+              <a:rPr lang="en-US" b="1" dirty="0">
+                <a:solidFill>
+                  <a:srgbClr val="569CD6"/>
+                </a:solidFill>
+                <a:effectLst/>
+                <a:latin typeface="Inconsolata NF Regular" pitchFamily="49" charset="77"/>
+              </a:rPr>
+              <a:t>Marking the Ticket as Done</a:t>
+            </a:r>
+            <a:br>
+              <a:rPr lang="en-US" b="1" dirty="0">
+                <a:solidFill>
+                  <a:srgbClr val="569CD6"/>
+                </a:solidFill>
+                <a:effectLst/>
+                <a:latin typeface="Inconsolata NF Regular" pitchFamily="49" charset="77"/>
+              </a:rPr>
+            </a:br>
+            <a:br>
+              <a:rPr lang="en-US" b="1" dirty="0">
+                <a:solidFill>
+                  <a:srgbClr val="569CD6"/>
+                </a:solidFill>
+                <a:effectLst/>
+                <a:latin typeface="Inconsolata NF Regular" pitchFamily="49" charset="77"/>
+              </a:rPr>
+            </a:br>
+            <a:r>
+              <a:rPr lang="en-US" sz="10700" b="1" dirty="0">
+                <a:solidFill>
+                  <a:srgbClr val="569CD6"/>
+                </a:solidFill>
+                <a:effectLst/>
+                <a:latin typeface="Inconsolata NF Regular" pitchFamily="49" charset="77"/>
+              </a:rPr>
+              <a:t>🎉</a:t>
+            </a:r>
+            <a:endParaRPr lang="en-US" dirty="0"/>
+          </a:p>
+        </p:txBody>
+      </p:sp>
+    </p:spTree>
+    <p:extLst>
+      <p:ext uri="{BB962C8B-B14F-4D97-AF65-F5344CB8AC3E}">
+        <p14:creationId xmlns:p14="http://schemas.microsoft.com/office/powerpoint/2010/main" val="4220759133"/>
+      </p:ext>
+    </p:extLst>
+  </p:cSld>
+  <p:clrMapOvr>
+    <a:masterClrMapping/>
+  </p:clrMapOvr>
+</p:sld>
+</file>
+
+<file path=ppt/slides/slide14.xml><?xml version="1.0" encoding="utf-8"?>
+<p:sld xmlns:a="http://schemas.openxmlformats.org/drawingml/2006/main" xmlns:r="http://schemas.openxmlformats.org/officeDocument/2006/relationships" xmlns:p="http://schemas.openxmlformats.org/presentationml/2006/main">
+  <p:cSld>
+    <p:spTree>
+      <p:nvGrpSpPr>
+        <p:cNvPr id="1" name=""/>
+        <p:cNvGrpSpPr/>
+        <p:nvPr/>
+      </p:nvGrpSpPr>
+      <p:grpSpPr>
+        <a:xfrm>
+          <a:off x="0" y="0"/>
+          <a:ext cx="0" cy="0"/>
+          <a:chOff x="0" y="0"/>
+          <a:chExt cx="0" cy="0"/>
+        </a:xfrm>
+      </p:grpSpPr>
+      <p:sp>
+        <p:nvSpPr>
+          <p:cNvPr id="4" name="Title 3">
+            <a:extLst>
+              <a:ext uri="{FF2B5EF4-FFF2-40B4-BE49-F238E27FC236}">
+                <a16:creationId xmlns:a16="http://schemas.microsoft.com/office/drawing/2014/main" id="{4EC330F1-2E50-8B47-1D7A-DC1887E3FA13}"/>
+              </a:ext>
+            </a:extLst>
+          </p:cNvPr>
+          <p:cNvSpPr>
+            <a:spLocks noGrp="1"/>
+          </p:cNvSpPr>
+          <p:nvPr>
+            <p:ph type="title"/>
+          </p:nvPr>
+        </p:nvSpPr>
+        <p:spPr>
+          <a:xfrm>
+            <a:off x="838200" y="2621629"/>
+            <a:ext cx="10515600" cy="1325563"/>
+          </a:xfrm>
+        </p:spPr>
+        <p:txBody>
+          <a:bodyPr/>
+          <a:lstStyle/>
+          <a:p>
+            <a:pPr algn="ctr"/>
+            <a:r>
+              <a:rPr lang="en-US" b="1" dirty="0">
+                <a:solidFill>
+                  <a:srgbClr val="569CD6"/>
+                </a:solidFill>
+                <a:effectLst/>
+                <a:latin typeface="Inconsolata NF Regular" pitchFamily="49" charset="77"/>
+              </a:rPr>
+              <a:t>Letting everyone know!</a:t>
+            </a:r>
+            <a:endParaRPr lang="en-US" dirty="0"/>
+          </a:p>
+        </p:txBody>
+      </p:sp>
+    </p:spTree>
+    <p:extLst>
+      <p:ext uri="{BB962C8B-B14F-4D97-AF65-F5344CB8AC3E}">
+        <p14:creationId xmlns:p14="http://schemas.microsoft.com/office/powerpoint/2010/main" val="1823316219"/>
+      </p:ext>
+    </p:extLst>
+  </p:cSld>
+  <p:clrMapOvr>
+    <a:masterClrMapping/>
+  </p:clrMapOvr>
+</p:sld>
+</file>
+
+<file path=ppt/slides/slide15.xml><?xml version="1.0" encoding="utf-8"?>
+<p:sld xmlns:a="http://schemas.openxmlformats.org/drawingml/2006/main" xmlns:r="http://schemas.openxmlformats.org/officeDocument/2006/relationships" xmlns:p="http://schemas.openxmlformats.org/presentationml/2006/main">
+  <p:cSld>
+    <p:spTree>
+      <p:nvGrpSpPr>
+        <p:cNvPr id="1" name=""/>
+        <p:cNvGrpSpPr/>
+        <p:nvPr/>
+      </p:nvGrpSpPr>
+      <p:grpSpPr>
+        <a:xfrm>
+          <a:off x="0" y="0"/>
+          <a:ext cx="0" cy="0"/>
+          <a:chOff x="0" y="0"/>
+          <a:chExt cx="0" cy="0"/>
+        </a:xfrm>
+      </p:grpSpPr>
+      <p:sp>
+        <p:nvSpPr>
+          <p:cNvPr id="4" name="Title 3">
+            <a:extLst>
+              <a:ext uri="{FF2B5EF4-FFF2-40B4-BE49-F238E27FC236}">
+                <a16:creationId xmlns:a16="http://schemas.microsoft.com/office/drawing/2014/main" id="{4EC330F1-2E50-8B47-1D7A-DC1887E3FA13}"/>
+              </a:ext>
+            </a:extLst>
+          </p:cNvPr>
+          <p:cNvSpPr>
+            <a:spLocks noGrp="1"/>
+          </p:cNvSpPr>
+          <p:nvPr>
+            <p:ph type="title"/>
+          </p:nvPr>
+        </p:nvSpPr>
+        <p:spPr>
+          <a:xfrm>
+            <a:off x="838200" y="2621629"/>
+            <a:ext cx="10515600" cy="1325563"/>
+          </a:xfrm>
+        </p:spPr>
+        <p:txBody>
+          <a:bodyPr/>
+          <a:lstStyle/>
+          <a:p>
+            <a:pPr algn="ctr"/>
+            <a:r>
+              <a:rPr lang="en-US" b="1" dirty="0">
+                <a:solidFill>
+                  <a:srgbClr val="569CD6"/>
+                </a:solidFill>
+                <a:effectLst/>
+                <a:latin typeface="Inconsolata NF Regular" pitchFamily="49" charset="77"/>
+              </a:rPr>
+              <a:t>Home</a:t>
+            </a:r>
+            <a:endParaRPr lang="en-US" dirty="0"/>
+          </a:p>
+        </p:txBody>
+      </p:sp>
+    </p:spTree>
+    <p:extLst>
+      <p:ext uri="{BB962C8B-B14F-4D97-AF65-F5344CB8AC3E}">
+        <p14:creationId xmlns:p14="http://schemas.microsoft.com/office/powerpoint/2010/main" val="1523360119"/>
+      </p:ext>
+    </p:extLst>
+  </p:cSld>
+  <p:clrMapOvr>
+    <a:masterClrMapping/>
+  </p:clrMapOvr>
+</p:sld>
+</file>
+
+<file path=ppt/slides/slide16.xml><?xml version="1.0" encoding="utf-8"?>
+<p:sld xmlns:a="http://schemas.openxmlformats.org/drawingml/2006/main" xmlns:r="http://schemas.openxmlformats.org/officeDocument/2006/relationships" xmlns:p="http://schemas.openxmlformats.org/presentationml/2006/main">
+  <p:cSld>
+    <p:spTree>
+      <p:nvGrpSpPr>
+        <p:cNvPr id="1" name=""/>
+        <p:cNvGrpSpPr/>
+        <p:nvPr/>
+      </p:nvGrpSpPr>
+      <p:grpSpPr>
+        <a:xfrm>
+          <a:off x="0" y="0"/>
+          <a:ext cx="0" cy="0"/>
+          <a:chOff x="0" y="0"/>
+          <a:chExt cx="0" cy="0"/>
+        </a:xfrm>
+      </p:grpSpPr>
+      <p:sp>
+        <p:nvSpPr>
+          <p:cNvPr id="4" name="Title 3">
+            <a:extLst>
+              <a:ext uri="{FF2B5EF4-FFF2-40B4-BE49-F238E27FC236}">
+                <a16:creationId xmlns:a16="http://schemas.microsoft.com/office/drawing/2014/main" id="{4EC330F1-2E50-8B47-1D7A-DC1887E3FA13}"/>
+              </a:ext>
+            </a:extLst>
+          </p:cNvPr>
+          <p:cNvSpPr>
+            <a:spLocks noGrp="1"/>
+          </p:cNvSpPr>
+          <p:nvPr>
+            <p:ph type="title"/>
+          </p:nvPr>
+        </p:nvSpPr>
+        <p:spPr>
+          <a:xfrm>
+            <a:off x="838200" y="2621629"/>
+            <a:ext cx="10515600" cy="1325563"/>
+          </a:xfrm>
+        </p:spPr>
+        <p:txBody>
+          <a:bodyPr/>
+          <a:lstStyle/>
+          <a:p>
+            <a:pPr algn="ctr"/>
+            <a:r>
+              <a:rPr lang="en-US" b="1" dirty="0">
+                <a:solidFill>
+                  <a:srgbClr val="569CD6"/>
+                </a:solidFill>
+                <a:effectLst/>
+                <a:latin typeface="Inconsolata NF Regular" pitchFamily="49" charset="77"/>
+              </a:rPr>
+              <a:t>But then … </a:t>
+            </a:r>
+            <a:endParaRPr lang="en-US" dirty="0"/>
+          </a:p>
+        </p:txBody>
+      </p:sp>
+    </p:spTree>
+    <p:extLst>
+      <p:ext uri="{BB962C8B-B14F-4D97-AF65-F5344CB8AC3E}">
+        <p14:creationId xmlns:p14="http://schemas.microsoft.com/office/powerpoint/2010/main" val="994405587"/>
+      </p:ext>
+    </p:extLst>
+  </p:cSld>
+  <p:clrMapOvr>
+    <a:masterClrMapping/>
+  </p:clrMapOvr>
+</p:sld>
+</file>
+
+<file path=ppt/slides/slide17.xml><?xml version="1.0" encoding="utf-8"?>
+<p:sld xmlns:a="http://schemas.openxmlformats.org/drawingml/2006/main" xmlns:r="http://schemas.openxmlformats.org/officeDocument/2006/relationships" xmlns:p="http://schemas.openxmlformats.org/presentationml/2006/main">
+  <p:cSld>
+    <p:spTree>
+      <p:nvGrpSpPr>
+        <p:cNvPr id="1" name=""/>
+        <p:cNvGrpSpPr/>
+        <p:nvPr/>
+      </p:nvGrpSpPr>
+      <p:grpSpPr>
+        <a:xfrm>
+          <a:off x="0" y="0"/>
+          <a:ext cx="0" cy="0"/>
+          <a:chOff x="0" y="0"/>
+          <a:chExt cx="0" cy="0"/>
+        </a:xfrm>
+      </p:grpSpPr>
+      <p:pic>
+        <p:nvPicPr>
+          <p:cNvPr id="4" name="Picture 3">
+            <a:extLst>
+              <a:ext uri="{FF2B5EF4-FFF2-40B4-BE49-F238E27FC236}">
+                <a16:creationId xmlns:a16="http://schemas.microsoft.com/office/drawing/2014/main" id="{4494AF25-3049-5D77-5482-FDC898457E17}"/>
+              </a:ext>
+            </a:extLst>
+          </p:cNvPr>
+          <p:cNvPicPr>
+            <a:picLocks noChangeAspect="1"/>
+          </p:cNvPicPr>
+          <p:nvPr/>
+        </p:nvPicPr>
+        <p:blipFill>
+          <a:blip r:embed="rId2"/>
+          <a:stretch>
+            <a:fillRect/>
+          </a:stretch>
+        </p:blipFill>
+        <p:spPr>
+          <a:xfrm>
+            <a:off x="643889" y="1480779"/>
+            <a:ext cx="10904222" cy="3896442"/>
+          </a:xfrm>
+          <a:prstGeom prst="rect">
+            <a:avLst/>
+          </a:prstGeom>
+        </p:spPr>
+      </p:pic>
+    </p:spTree>
+    <p:extLst>
+      <p:ext uri="{BB962C8B-B14F-4D97-AF65-F5344CB8AC3E}">
+        <p14:creationId xmlns:p14="http://schemas.microsoft.com/office/powerpoint/2010/main" val="2731698717"/>
+      </p:ext>
+    </p:extLst>
+  </p:cSld>
+  <p:clrMapOvr>
+    <a:masterClrMapping/>
+  </p:clrMapOvr>
+</p:sld>
+</file>
+
+<file path=ppt/slides/slide18.xml><?xml version="1.0" encoding="utf-8"?>
+<p:sld xmlns:a="http://schemas.openxmlformats.org/drawingml/2006/main" xmlns:r="http://schemas.openxmlformats.org/officeDocument/2006/relationships" xmlns:p="http://schemas.openxmlformats.org/presentationml/2006/main">
+  <p:cSld>
+    <p:spTree>
+      <p:nvGrpSpPr>
+        <p:cNvPr id="1" name=""/>
+        <p:cNvGrpSpPr/>
+        <p:nvPr/>
+      </p:nvGrpSpPr>
+      <p:grpSpPr>
+        <a:xfrm>
+          <a:off x="0" y="0"/>
+          <a:ext cx="0" cy="0"/>
+          <a:chOff x="0" y="0"/>
+          <a:chExt cx="0" cy="0"/>
+        </a:xfrm>
+      </p:grpSpPr>
+      <p:sp>
+        <p:nvSpPr>
+          <p:cNvPr id="4" name="Title 3">
+            <a:extLst>
+              <a:ext uri="{FF2B5EF4-FFF2-40B4-BE49-F238E27FC236}">
+                <a16:creationId xmlns:a16="http://schemas.microsoft.com/office/drawing/2014/main" id="{4EC330F1-2E50-8B47-1D7A-DC1887E3FA13}"/>
+              </a:ext>
+            </a:extLst>
+          </p:cNvPr>
+          <p:cNvSpPr>
+            <a:spLocks noGrp="1"/>
+          </p:cNvSpPr>
+          <p:nvPr>
+            <p:ph type="title"/>
+          </p:nvPr>
+        </p:nvSpPr>
+        <p:spPr>
+          <a:xfrm>
+            <a:off x="838200" y="2621629"/>
+            <a:ext cx="10515600" cy="1325563"/>
+          </a:xfrm>
+        </p:spPr>
+        <p:txBody>
+          <a:bodyPr/>
+          <a:lstStyle/>
+          <a:p>
+            <a:pPr algn="ctr"/>
+            <a:r>
+              <a:rPr lang="en-US" b="1" dirty="0">
+                <a:solidFill>
+                  <a:srgbClr val="569CD6"/>
+                </a:solidFill>
+                <a:effectLst/>
+                <a:latin typeface="Inconsolata NF Regular" pitchFamily="49" charset="77"/>
+              </a:rPr>
+              <a:t>Oh no! </a:t>
+            </a:r>
+            <a:endParaRPr lang="en-US" dirty="0"/>
+          </a:p>
+        </p:txBody>
+      </p:sp>
+    </p:spTree>
+    <p:extLst>
+      <p:ext uri="{BB962C8B-B14F-4D97-AF65-F5344CB8AC3E}">
+        <p14:creationId xmlns:p14="http://schemas.microsoft.com/office/powerpoint/2010/main" val="4029205248"/>
+      </p:ext>
+    </p:extLst>
+  </p:cSld>
+  <p:clrMapOvr>
+    <a:masterClrMapping/>
+  </p:clrMapOvr>
+</p:sld>
+</file>
+
+<file path=ppt/slides/slide19.xml><?xml version="1.0" encoding="utf-8"?>
+<p:sld xmlns:a="http://schemas.openxmlformats.org/drawingml/2006/main" xmlns:r="http://schemas.openxmlformats.org/officeDocument/2006/relationships" xmlns:p="http://schemas.openxmlformats.org/presentationml/2006/main">
+  <p:cSld>
+    <p:spTree>
+      <p:nvGrpSpPr>
+        <p:cNvPr id="1" name=""/>
+        <p:cNvGrpSpPr/>
+        <p:nvPr/>
+      </p:nvGrpSpPr>
+      <p:grpSpPr>
+        <a:xfrm>
+          <a:off x="0" y="0"/>
+          <a:ext cx="0" cy="0"/>
+          <a:chOff x="0" y="0"/>
+          <a:chExt cx="0" cy="0"/>
+        </a:xfrm>
+      </p:grpSpPr>
+      <p:sp>
+        <p:nvSpPr>
+          <p:cNvPr id="4" name="Title 3">
+            <a:extLst>
+              <a:ext uri="{FF2B5EF4-FFF2-40B4-BE49-F238E27FC236}">
+                <a16:creationId xmlns:a16="http://schemas.microsoft.com/office/drawing/2014/main" id="{4EC330F1-2E50-8B47-1D7A-DC1887E3FA13}"/>
+              </a:ext>
+            </a:extLst>
+          </p:cNvPr>
+          <p:cNvSpPr>
+            <a:spLocks noGrp="1"/>
+          </p:cNvSpPr>
+          <p:nvPr>
+            <p:ph type="title"/>
+          </p:nvPr>
+        </p:nvSpPr>
+        <p:spPr>
+          <a:xfrm>
+            <a:off x="838200" y="2621629"/>
+            <a:ext cx="10515600" cy="1325563"/>
+          </a:xfrm>
+        </p:spPr>
+        <p:txBody>
+          <a:bodyPr/>
+          <a:lstStyle/>
+          <a:p>
+            <a:pPr algn="ctr"/>
+            <a:r>
+              <a:rPr lang="en-US" b="1" dirty="0">
+                <a:solidFill>
+                  <a:srgbClr val="569CD6"/>
+                </a:solidFill>
+                <a:effectLst/>
+                <a:latin typeface="Inconsolata NF Regular" pitchFamily="49" charset="77"/>
+              </a:rPr>
+              <a:t>Embarrassment </a:t>
+            </a:r>
+            <a:endParaRPr lang="en-US" dirty="0"/>
+          </a:p>
+        </p:txBody>
+      </p:sp>
+    </p:spTree>
+    <p:extLst>
+      <p:ext uri="{BB962C8B-B14F-4D97-AF65-F5344CB8AC3E}">
+        <p14:creationId xmlns:p14="http://schemas.microsoft.com/office/powerpoint/2010/main" val="725715614"/>
+      </p:ext>
+    </p:extLst>
+  </p:cSld>
+  <p:clrMapOvr>
+    <a:masterClrMapping/>
+  </p:clrMapOvr>
+</p:sld>
+</file>
+
 <file path=ppt/slides/slide2.xml><?xml version="1.0" encoding="utf-8"?>
 <p:sld xmlns:a="http://schemas.openxmlformats.org/drawingml/2006/main" xmlns:r="http://schemas.openxmlformats.org/officeDocument/2006/relationships" xmlns:p="http://schemas.openxmlformats.org/presentationml/2006/main">
   <p:cSld>
@@ -5229,10 +8368,857 @@
           </a:p>
         </p:txBody>
       </p:sp>
+      <p:pic>
+        <p:nvPicPr>
+          <p:cNvPr id="1026" name="Picture 2" descr="Mount Whitney Trail - Wikipedia">
+            <a:extLst>
+              <a:ext uri="{FF2B5EF4-FFF2-40B4-BE49-F238E27FC236}">
+                <a16:creationId xmlns:a16="http://schemas.microsoft.com/office/drawing/2014/main" id="{DBEDA4D7-F825-34AD-90FD-0DB58899F8DA}"/>
+              </a:ext>
+            </a:extLst>
+          </p:cNvPr>
+          <p:cNvPicPr>
+            <a:picLocks noChangeAspect="1" noChangeArrowheads="1"/>
+          </p:cNvPicPr>
+          <p:nvPr/>
+        </p:nvPicPr>
+        <p:blipFill>
+          <a:blip r:embed="rId3">
+            <a:extLst>
+              <a:ext uri="{28A0092B-C50C-407E-A947-70E740481C1C}">
+                <a14:useLocalDpi xmlns:a14="http://schemas.microsoft.com/office/drawing/2010/main" val="0"/>
+              </a:ext>
+            </a:extLst>
+          </a:blip>
+          <a:srcRect/>
+          <a:stretch>
+            <a:fillRect/>
+          </a:stretch>
+        </p:blipFill>
+        <p:spPr bwMode="auto">
+          <a:xfrm>
+            <a:off x="1881718" y="268289"/>
+            <a:ext cx="8428563" cy="6321422"/>
+          </a:xfrm>
+          <a:prstGeom prst="rect">
+            <a:avLst/>
+          </a:prstGeom>
+          <a:noFill/>
+          <a:extLst>
+            <a:ext uri="{909E8E84-426E-40DD-AFC4-6F175D3DCCD1}">
+              <a14:hiddenFill xmlns:a14="http://schemas.microsoft.com/office/drawing/2010/main">
+                <a:solidFill>
+                  <a:srgbClr val="FFFFFF"/>
+                </a:solidFill>
+              </a14:hiddenFill>
+            </a:ext>
+          </a:extLst>
+        </p:spPr>
+      </p:pic>
     </p:spTree>
     <p:extLst>
       <p:ext uri="{BB962C8B-B14F-4D97-AF65-F5344CB8AC3E}">
         <p14:creationId xmlns:p14="http://schemas.microsoft.com/office/powerpoint/2010/main" val="1138993927"/>
+      </p:ext>
+    </p:extLst>
+  </p:cSld>
+  <p:clrMapOvr>
+    <a:masterClrMapping/>
+  </p:clrMapOvr>
+</p:sld>
+</file>
+
+<file path=ppt/slides/slide20.xml><?xml version="1.0" encoding="utf-8"?>
+<p:sld xmlns:a="http://schemas.openxmlformats.org/drawingml/2006/main" xmlns:r="http://schemas.openxmlformats.org/officeDocument/2006/relationships" xmlns:p="http://schemas.openxmlformats.org/presentationml/2006/main">
+  <p:cSld>
+    <p:spTree>
+      <p:nvGrpSpPr>
+        <p:cNvPr id="1" name=""/>
+        <p:cNvGrpSpPr/>
+        <p:nvPr/>
+      </p:nvGrpSpPr>
+      <p:grpSpPr>
+        <a:xfrm>
+          <a:off x="0" y="0"/>
+          <a:ext cx="0" cy="0"/>
+          <a:chOff x="0" y="0"/>
+          <a:chExt cx="0" cy="0"/>
+        </a:xfrm>
+      </p:grpSpPr>
+      <p:sp>
+        <p:nvSpPr>
+          <p:cNvPr id="4" name="Title 3">
+            <a:extLst>
+              <a:ext uri="{FF2B5EF4-FFF2-40B4-BE49-F238E27FC236}">
+                <a16:creationId xmlns:a16="http://schemas.microsoft.com/office/drawing/2014/main" id="{4EC330F1-2E50-8B47-1D7A-DC1887E3FA13}"/>
+              </a:ext>
+            </a:extLst>
+          </p:cNvPr>
+          <p:cNvSpPr>
+            <a:spLocks noGrp="1"/>
+          </p:cNvSpPr>
+          <p:nvPr>
+            <p:ph type="title"/>
+          </p:nvPr>
+        </p:nvSpPr>
+        <p:spPr>
+          <a:xfrm>
+            <a:off x="838200" y="2621629"/>
+            <a:ext cx="10515600" cy="1325563"/>
+          </a:xfrm>
+        </p:spPr>
+        <p:txBody>
+          <a:bodyPr/>
+          <a:lstStyle/>
+          <a:p>
+            <a:pPr algn="ctr"/>
+            <a:r>
+              <a:rPr lang="en-US" b="1" dirty="0">
+                <a:solidFill>
+                  <a:srgbClr val="569CD6"/>
+                </a:solidFill>
+                <a:effectLst/>
+                <a:latin typeface="Inconsolata NF Regular" pitchFamily="49" charset="77"/>
+              </a:rPr>
+              <a:t>Fear </a:t>
+            </a:r>
+            <a:endParaRPr lang="en-US" dirty="0"/>
+          </a:p>
+        </p:txBody>
+      </p:sp>
+    </p:spTree>
+    <p:extLst>
+      <p:ext uri="{BB962C8B-B14F-4D97-AF65-F5344CB8AC3E}">
+        <p14:creationId xmlns:p14="http://schemas.microsoft.com/office/powerpoint/2010/main" val="1623673574"/>
+      </p:ext>
+    </p:extLst>
+  </p:cSld>
+  <p:clrMapOvr>
+    <a:masterClrMapping/>
+  </p:clrMapOvr>
+</p:sld>
+</file>
+
+<file path=ppt/slides/slide21.xml><?xml version="1.0" encoding="utf-8"?>
+<p:sld xmlns:a="http://schemas.openxmlformats.org/drawingml/2006/main" xmlns:r="http://schemas.openxmlformats.org/officeDocument/2006/relationships" xmlns:p="http://schemas.openxmlformats.org/presentationml/2006/main">
+  <p:cSld>
+    <p:spTree>
+      <p:nvGrpSpPr>
+        <p:cNvPr id="1" name=""/>
+        <p:cNvGrpSpPr/>
+        <p:nvPr/>
+      </p:nvGrpSpPr>
+      <p:grpSpPr>
+        <a:xfrm>
+          <a:off x="0" y="0"/>
+          <a:ext cx="0" cy="0"/>
+          <a:chOff x="0" y="0"/>
+          <a:chExt cx="0" cy="0"/>
+        </a:xfrm>
+      </p:grpSpPr>
+      <p:sp>
+        <p:nvSpPr>
+          <p:cNvPr id="4" name="Title 3">
+            <a:extLst>
+              <a:ext uri="{FF2B5EF4-FFF2-40B4-BE49-F238E27FC236}">
+                <a16:creationId xmlns:a16="http://schemas.microsoft.com/office/drawing/2014/main" id="{4EC330F1-2E50-8B47-1D7A-DC1887E3FA13}"/>
+              </a:ext>
+            </a:extLst>
+          </p:cNvPr>
+          <p:cNvSpPr>
+            <a:spLocks noGrp="1"/>
+          </p:cNvSpPr>
+          <p:nvPr>
+            <p:ph type="title"/>
+          </p:nvPr>
+        </p:nvSpPr>
+        <p:spPr>
+          <a:xfrm>
+            <a:off x="838200" y="2621629"/>
+            <a:ext cx="10515600" cy="1325563"/>
+          </a:xfrm>
+        </p:spPr>
+        <p:txBody>
+          <a:bodyPr/>
+          <a:lstStyle/>
+          <a:p>
+            <a:pPr algn="ctr"/>
+            <a:r>
+              <a:rPr lang="en-US" b="1" dirty="0">
+                <a:solidFill>
+                  <a:srgbClr val="569CD6"/>
+                </a:solidFill>
+                <a:effectLst/>
+                <a:latin typeface="Inconsolata NF Regular" pitchFamily="49" charset="77"/>
+              </a:rPr>
+              <a:t>Community </a:t>
+            </a:r>
+            <a:endParaRPr lang="en-US" dirty="0"/>
+          </a:p>
+        </p:txBody>
+      </p:sp>
+      <p:pic>
+        <p:nvPicPr>
+          <p:cNvPr id="2" name="Picture 1">
+            <a:extLst>
+              <a:ext uri="{FF2B5EF4-FFF2-40B4-BE49-F238E27FC236}">
+                <a16:creationId xmlns:a16="http://schemas.microsoft.com/office/drawing/2014/main" id="{9D9262A3-B178-C4FF-2DCB-769ED835C21B}"/>
+              </a:ext>
+            </a:extLst>
+          </p:cNvPr>
+          <p:cNvPicPr>
+            <a:picLocks noChangeAspect="1"/>
+          </p:cNvPicPr>
+          <p:nvPr/>
+        </p:nvPicPr>
+        <p:blipFill>
+          <a:blip r:embed="rId3"/>
+          <a:stretch>
+            <a:fillRect/>
+          </a:stretch>
+        </p:blipFill>
+        <p:spPr>
+          <a:xfrm>
+            <a:off x="10282494" y="4950337"/>
+            <a:ext cx="1803400" cy="1765300"/>
+          </a:xfrm>
+          <a:prstGeom prst="rect">
+            <a:avLst/>
+          </a:prstGeom>
+        </p:spPr>
+      </p:pic>
+    </p:spTree>
+    <p:extLst>
+      <p:ext uri="{BB962C8B-B14F-4D97-AF65-F5344CB8AC3E}">
+        <p14:creationId xmlns:p14="http://schemas.microsoft.com/office/powerpoint/2010/main" val="2748865991"/>
+      </p:ext>
+    </p:extLst>
+  </p:cSld>
+  <p:clrMapOvr>
+    <a:masterClrMapping/>
+  </p:clrMapOvr>
+</p:sld>
+</file>
+
+<file path=ppt/slides/slide22.xml><?xml version="1.0" encoding="utf-8"?>
+<p:sld xmlns:a="http://schemas.openxmlformats.org/drawingml/2006/main" xmlns:r="http://schemas.openxmlformats.org/officeDocument/2006/relationships" xmlns:p="http://schemas.openxmlformats.org/presentationml/2006/main">
+  <p:cSld>
+    <p:spTree>
+      <p:nvGrpSpPr>
+        <p:cNvPr id="1" name=""/>
+        <p:cNvGrpSpPr/>
+        <p:nvPr/>
+      </p:nvGrpSpPr>
+      <p:grpSpPr>
+        <a:xfrm>
+          <a:off x="0" y="0"/>
+          <a:ext cx="0" cy="0"/>
+          <a:chOff x="0" y="0"/>
+          <a:chExt cx="0" cy="0"/>
+        </a:xfrm>
+      </p:grpSpPr>
+      <p:sp>
+        <p:nvSpPr>
+          <p:cNvPr id="4" name="Title 3">
+            <a:extLst>
+              <a:ext uri="{FF2B5EF4-FFF2-40B4-BE49-F238E27FC236}">
+                <a16:creationId xmlns:a16="http://schemas.microsoft.com/office/drawing/2014/main" id="{4EC330F1-2E50-8B47-1D7A-DC1887E3FA13}"/>
+              </a:ext>
+            </a:extLst>
+          </p:cNvPr>
+          <p:cNvSpPr>
+            <a:spLocks noGrp="1"/>
+          </p:cNvSpPr>
+          <p:nvPr>
+            <p:ph type="title"/>
+          </p:nvPr>
+        </p:nvSpPr>
+        <p:spPr>
+          <a:xfrm>
+            <a:off x="838200" y="2621629"/>
+            <a:ext cx="10515600" cy="1325563"/>
+          </a:xfrm>
+        </p:spPr>
+        <p:txBody>
+          <a:bodyPr/>
+          <a:lstStyle/>
+          <a:p>
+            <a:pPr algn="ctr"/>
+            <a:r>
+              <a:rPr lang="en-US" b="1" dirty="0">
+                <a:solidFill>
+                  <a:srgbClr val="569CD6"/>
+                </a:solidFill>
+                <a:effectLst/>
+                <a:latin typeface="Inconsolata NF Regular" pitchFamily="49" charset="77"/>
+              </a:rPr>
+              <a:t>Working on the Ticket</a:t>
+            </a:r>
+            <a:endParaRPr lang="en-US" dirty="0"/>
+          </a:p>
+        </p:txBody>
+      </p:sp>
+    </p:spTree>
+    <p:extLst>
+      <p:ext uri="{BB962C8B-B14F-4D97-AF65-F5344CB8AC3E}">
+        <p14:creationId xmlns:p14="http://schemas.microsoft.com/office/powerpoint/2010/main" val="4084933226"/>
+      </p:ext>
+    </p:extLst>
+  </p:cSld>
+  <p:clrMapOvr>
+    <a:masterClrMapping/>
+  </p:clrMapOvr>
+</p:sld>
+</file>
+
+<file path=ppt/slides/slide23.xml><?xml version="1.0" encoding="utf-8"?>
+<p:sld xmlns:a="http://schemas.openxmlformats.org/drawingml/2006/main" xmlns:r="http://schemas.openxmlformats.org/officeDocument/2006/relationships" xmlns:p="http://schemas.openxmlformats.org/presentationml/2006/main">
+  <p:cSld>
+    <p:spTree>
+      <p:nvGrpSpPr>
+        <p:cNvPr id="1" name=""/>
+        <p:cNvGrpSpPr/>
+        <p:nvPr/>
+      </p:nvGrpSpPr>
+      <p:grpSpPr>
+        <a:xfrm>
+          <a:off x="0" y="0"/>
+          <a:ext cx="0" cy="0"/>
+          <a:chOff x="0" y="0"/>
+          <a:chExt cx="0" cy="0"/>
+        </a:xfrm>
+      </p:grpSpPr>
+      <p:sp>
+        <p:nvSpPr>
+          <p:cNvPr id="4" name="Title 3">
+            <a:extLst>
+              <a:ext uri="{FF2B5EF4-FFF2-40B4-BE49-F238E27FC236}">
+                <a16:creationId xmlns:a16="http://schemas.microsoft.com/office/drawing/2014/main" id="{4EC330F1-2E50-8B47-1D7A-DC1887E3FA13}"/>
+              </a:ext>
+            </a:extLst>
+          </p:cNvPr>
+          <p:cNvSpPr>
+            <a:spLocks noGrp="1"/>
+          </p:cNvSpPr>
+          <p:nvPr>
+            <p:ph type="title"/>
+          </p:nvPr>
+        </p:nvSpPr>
+        <p:spPr>
+          <a:xfrm>
+            <a:off x="838200" y="2621629"/>
+            <a:ext cx="10515600" cy="1325563"/>
+          </a:xfrm>
+        </p:spPr>
+        <p:txBody>
+          <a:bodyPr/>
+          <a:lstStyle/>
+          <a:p>
+            <a:pPr algn="ctr"/>
+            <a:r>
+              <a:rPr lang="en-US" b="1" dirty="0">
+                <a:solidFill>
+                  <a:srgbClr val="569CD6"/>
+                </a:solidFill>
+                <a:effectLst/>
+                <a:latin typeface="Inconsolata NF Regular" pitchFamily="49" charset="77"/>
+              </a:rPr>
+              <a:t>Public Notes</a:t>
+            </a:r>
+            <a:endParaRPr lang="en-US" dirty="0"/>
+          </a:p>
+        </p:txBody>
+      </p:sp>
+      <p:pic>
+        <p:nvPicPr>
+          <p:cNvPr id="2" name="Picture 1">
+            <a:extLst>
+              <a:ext uri="{FF2B5EF4-FFF2-40B4-BE49-F238E27FC236}">
+                <a16:creationId xmlns:a16="http://schemas.microsoft.com/office/drawing/2014/main" id="{AC851C8B-862B-0CA5-9601-8A95A2B39C34}"/>
+              </a:ext>
+            </a:extLst>
+          </p:cNvPr>
+          <p:cNvPicPr>
+            <a:picLocks noChangeAspect="1"/>
+          </p:cNvPicPr>
+          <p:nvPr/>
+        </p:nvPicPr>
+        <p:blipFill>
+          <a:blip r:embed="rId3"/>
+          <a:stretch>
+            <a:fillRect/>
+          </a:stretch>
+        </p:blipFill>
+        <p:spPr>
+          <a:xfrm>
+            <a:off x="10439400" y="5118100"/>
+            <a:ext cx="1752600" cy="1739900"/>
+          </a:xfrm>
+          <a:prstGeom prst="rect">
+            <a:avLst/>
+          </a:prstGeom>
+        </p:spPr>
+      </p:pic>
+    </p:spTree>
+    <p:extLst>
+      <p:ext uri="{BB962C8B-B14F-4D97-AF65-F5344CB8AC3E}">
+        <p14:creationId xmlns:p14="http://schemas.microsoft.com/office/powerpoint/2010/main" val="3418796821"/>
+      </p:ext>
+    </p:extLst>
+  </p:cSld>
+  <p:clrMapOvr>
+    <a:masterClrMapping/>
+  </p:clrMapOvr>
+</p:sld>
+</file>
+
+<file path=ppt/slides/slide24.xml><?xml version="1.0" encoding="utf-8"?>
+<p:sld xmlns:a="http://schemas.openxmlformats.org/drawingml/2006/main" xmlns:r="http://schemas.openxmlformats.org/officeDocument/2006/relationships" xmlns:p="http://schemas.openxmlformats.org/presentationml/2006/main">
+  <p:cSld>
+    <p:spTree>
+      <p:nvGrpSpPr>
+        <p:cNvPr id="1" name=""/>
+        <p:cNvGrpSpPr/>
+        <p:nvPr/>
+      </p:nvGrpSpPr>
+      <p:grpSpPr>
+        <a:xfrm>
+          <a:off x="0" y="0"/>
+          <a:ext cx="0" cy="0"/>
+          <a:chOff x="0" y="0"/>
+          <a:chExt cx="0" cy="0"/>
+        </a:xfrm>
+      </p:grpSpPr>
+      <p:sp>
+        <p:nvSpPr>
+          <p:cNvPr id="4" name="Title 3">
+            <a:extLst>
+              <a:ext uri="{FF2B5EF4-FFF2-40B4-BE49-F238E27FC236}">
+                <a16:creationId xmlns:a16="http://schemas.microsoft.com/office/drawing/2014/main" id="{4EC330F1-2E50-8B47-1D7A-DC1887E3FA13}"/>
+              </a:ext>
+            </a:extLst>
+          </p:cNvPr>
+          <p:cNvSpPr>
+            <a:spLocks noGrp="1"/>
+          </p:cNvSpPr>
+          <p:nvPr>
+            <p:ph type="title"/>
+          </p:nvPr>
+        </p:nvSpPr>
+        <p:spPr>
+          <a:xfrm>
+            <a:off x="838200" y="2621629"/>
+            <a:ext cx="10515600" cy="1325563"/>
+          </a:xfrm>
+        </p:spPr>
+        <p:txBody>
+          <a:bodyPr/>
+          <a:lstStyle/>
+          <a:p>
+            <a:pPr algn="ctr"/>
+            <a:r>
+              <a:rPr lang="en-US" b="1" dirty="0">
+                <a:solidFill>
+                  <a:srgbClr val="569CD6"/>
+                </a:solidFill>
+                <a:effectLst/>
+                <a:latin typeface="Inconsolata NF Regular" pitchFamily="49" charset="77"/>
+              </a:rPr>
+              <a:t>My Public Notes</a:t>
+            </a:r>
+            <a:endParaRPr lang="en-US" dirty="0"/>
+          </a:p>
+        </p:txBody>
+      </p:sp>
+      <p:pic>
+        <p:nvPicPr>
+          <p:cNvPr id="3" name="Picture 2">
+            <a:extLst>
+              <a:ext uri="{FF2B5EF4-FFF2-40B4-BE49-F238E27FC236}">
+                <a16:creationId xmlns:a16="http://schemas.microsoft.com/office/drawing/2014/main" id="{8E381192-3332-C095-0F94-8281C0D63B97}"/>
+              </a:ext>
+            </a:extLst>
+          </p:cNvPr>
+          <p:cNvPicPr>
+            <a:picLocks noChangeAspect="1"/>
+          </p:cNvPicPr>
+          <p:nvPr/>
+        </p:nvPicPr>
+        <p:blipFill>
+          <a:blip r:embed="rId3"/>
+          <a:stretch>
+            <a:fillRect/>
+          </a:stretch>
+        </p:blipFill>
+        <p:spPr>
+          <a:xfrm>
+            <a:off x="0" y="5092700"/>
+            <a:ext cx="1778000" cy="1765300"/>
+          </a:xfrm>
+          <a:prstGeom prst="rect">
+            <a:avLst/>
+          </a:prstGeom>
+        </p:spPr>
+      </p:pic>
+    </p:spTree>
+    <p:extLst>
+      <p:ext uri="{BB962C8B-B14F-4D97-AF65-F5344CB8AC3E}">
+        <p14:creationId xmlns:p14="http://schemas.microsoft.com/office/powerpoint/2010/main" val="1154018757"/>
+      </p:ext>
+    </p:extLst>
+  </p:cSld>
+  <p:clrMapOvr>
+    <a:masterClrMapping/>
+  </p:clrMapOvr>
+</p:sld>
+</file>
+
+<file path=ppt/slides/slide25.xml><?xml version="1.0" encoding="utf-8"?>
+<p:sld xmlns:a="http://schemas.openxmlformats.org/drawingml/2006/main" xmlns:r="http://schemas.openxmlformats.org/officeDocument/2006/relationships" xmlns:p="http://schemas.openxmlformats.org/presentationml/2006/main">
+  <p:cSld>
+    <p:spTree>
+      <p:nvGrpSpPr>
+        <p:cNvPr id="1" name=""/>
+        <p:cNvGrpSpPr/>
+        <p:nvPr/>
+      </p:nvGrpSpPr>
+      <p:grpSpPr>
+        <a:xfrm>
+          <a:off x="0" y="0"/>
+          <a:ext cx="0" cy="0"/>
+          <a:chOff x="0" y="0"/>
+          <a:chExt cx="0" cy="0"/>
+        </a:xfrm>
+      </p:grpSpPr>
+      <p:sp>
+        <p:nvSpPr>
+          <p:cNvPr id="4" name="Title 3">
+            <a:extLst>
+              <a:ext uri="{FF2B5EF4-FFF2-40B4-BE49-F238E27FC236}">
+                <a16:creationId xmlns:a16="http://schemas.microsoft.com/office/drawing/2014/main" id="{4EC330F1-2E50-8B47-1D7A-DC1887E3FA13}"/>
+              </a:ext>
+            </a:extLst>
+          </p:cNvPr>
+          <p:cNvSpPr>
+            <a:spLocks noGrp="1"/>
+          </p:cNvSpPr>
+          <p:nvPr>
+            <p:ph type="title"/>
+          </p:nvPr>
+        </p:nvSpPr>
+        <p:spPr>
+          <a:xfrm>
+            <a:off x="838200" y="2621629"/>
+            <a:ext cx="10515600" cy="1325563"/>
+          </a:xfrm>
+        </p:spPr>
+        <p:txBody>
+          <a:bodyPr/>
+          <a:lstStyle/>
+          <a:p>
+            <a:pPr algn="ctr"/>
+            <a:r>
+              <a:rPr lang="en-US" b="1" dirty="0">
+                <a:solidFill>
+                  <a:srgbClr val="569CD6"/>
+                </a:solidFill>
+                <a:effectLst/>
+                <a:latin typeface="Inconsolata NF Regular" pitchFamily="49" charset="77"/>
+              </a:rPr>
+              <a:t>The fix</a:t>
+            </a:r>
+            <a:endParaRPr lang="en-US" dirty="0"/>
+          </a:p>
+        </p:txBody>
+      </p:sp>
+    </p:spTree>
+    <p:extLst>
+      <p:ext uri="{BB962C8B-B14F-4D97-AF65-F5344CB8AC3E}">
+        <p14:creationId xmlns:p14="http://schemas.microsoft.com/office/powerpoint/2010/main" val="3414312763"/>
+      </p:ext>
+    </p:extLst>
+  </p:cSld>
+  <p:clrMapOvr>
+    <a:masterClrMapping/>
+  </p:clrMapOvr>
+</p:sld>
+</file>
+
+<file path=ppt/slides/slide26.xml><?xml version="1.0" encoding="utf-8"?>
+<p:sld xmlns:a="http://schemas.openxmlformats.org/drawingml/2006/main" xmlns:r="http://schemas.openxmlformats.org/officeDocument/2006/relationships" xmlns:p="http://schemas.openxmlformats.org/presentationml/2006/main">
+  <p:cSld>
+    <p:spTree>
+      <p:nvGrpSpPr>
+        <p:cNvPr id="1" name=""/>
+        <p:cNvGrpSpPr/>
+        <p:nvPr/>
+      </p:nvGrpSpPr>
+      <p:grpSpPr>
+        <a:xfrm>
+          <a:off x="0" y="0"/>
+          <a:ext cx="0" cy="0"/>
+          <a:chOff x="0" y="0"/>
+          <a:chExt cx="0" cy="0"/>
+        </a:xfrm>
+      </p:grpSpPr>
+      <p:sp>
+        <p:nvSpPr>
+          <p:cNvPr id="4" name="Title 3">
+            <a:extLst>
+              <a:ext uri="{FF2B5EF4-FFF2-40B4-BE49-F238E27FC236}">
+                <a16:creationId xmlns:a16="http://schemas.microsoft.com/office/drawing/2014/main" id="{4EC330F1-2E50-8B47-1D7A-DC1887E3FA13}"/>
+              </a:ext>
+            </a:extLst>
+          </p:cNvPr>
+          <p:cNvSpPr>
+            <a:spLocks noGrp="1"/>
+          </p:cNvSpPr>
+          <p:nvPr>
+            <p:ph type="title"/>
+          </p:nvPr>
+        </p:nvSpPr>
+        <p:spPr>
+          <a:xfrm>
+            <a:off x="838200" y="2621629"/>
+            <a:ext cx="10515600" cy="1325563"/>
+          </a:xfrm>
+        </p:spPr>
+        <p:txBody>
+          <a:bodyPr/>
+          <a:lstStyle/>
+          <a:p>
+            <a:pPr algn="ctr"/>
+            <a:r>
+              <a:rPr lang="en-US" b="1" dirty="0">
+                <a:solidFill>
+                  <a:srgbClr val="569CD6"/>
+                </a:solidFill>
+                <a:effectLst/>
+                <a:latin typeface="Inconsolata NF Regular" pitchFamily="49" charset="77"/>
+              </a:rPr>
+              <a:t>Lessons</a:t>
+            </a:r>
+            <a:endParaRPr lang="en-US" dirty="0"/>
+          </a:p>
+        </p:txBody>
+      </p:sp>
+    </p:spTree>
+    <p:extLst>
+      <p:ext uri="{BB962C8B-B14F-4D97-AF65-F5344CB8AC3E}">
+        <p14:creationId xmlns:p14="http://schemas.microsoft.com/office/powerpoint/2010/main" val="3625854982"/>
+      </p:ext>
+    </p:extLst>
+  </p:cSld>
+  <p:clrMapOvr>
+    <a:masterClrMapping/>
+  </p:clrMapOvr>
+</p:sld>
+</file>
+
+<file path=ppt/slides/slide27.xml><?xml version="1.0" encoding="utf-8"?>
+<p:sld xmlns:a="http://schemas.openxmlformats.org/drawingml/2006/main" xmlns:r="http://schemas.openxmlformats.org/officeDocument/2006/relationships" xmlns:p="http://schemas.openxmlformats.org/presentationml/2006/main">
+  <p:cSld>
+    <p:spTree>
+      <p:nvGrpSpPr>
+        <p:cNvPr id="1" name=""/>
+        <p:cNvGrpSpPr/>
+        <p:nvPr/>
+      </p:nvGrpSpPr>
+      <p:grpSpPr>
+        <a:xfrm>
+          <a:off x="0" y="0"/>
+          <a:ext cx="0" cy="0"/>
+          <a:chOff x="0" y="0"/>
+          <a:chExt cx="0" cy="0"/>
+        </a:xfrm>
+      </p:grpSpPr>
+      <p:sp>
+        <p:nvSpPr>
+          <p:cNvPr id="4" name="Title 3">
+            <a:extLst>
+              <a:ext uri="{FF2B5EF4-FFF2-40B4-BE49-F238E27FC236}">
+                <a16:creationId xmlns:a16="http://schemas.microsoft.com/office/drawing/2014/main" id="{4EC330F1-2E50-8B47-1D7A-DC1887E3FA13}"/>
+              </a:ext>
+            </a:extLst>
+          </p:cNvPr>
+          <p:cNvSpPr>
+            <a:spLocks noGrp="1"/>
+          </p:cNvSpPr>
+          <p:nvPr>
+            <p:ph type="title"/>
+          </p:nvPr>
+        </p:nvSpPr>
+        <p:spPr>
+          <a:xfrm>
+            <a:off x="838200" y="2621629"/>
+            <a:ext cx="10515600" cy="1325563"/>
+          </a:xfrm>
+        </p:spPr>
+        <p:txBody>
+          <a:bodyPr/>
+          <a:lstStyle/>
+          <a:p>
+            <a:pPr algn="ctr"/>
+            <a:r>
+              <a:rPr lang="en-US" b="1" dirty="0">
+                <a:solidFill>
+                  <a:srgbClr val="569CD6"/>
+                </a:solidFill>
+                <a:effectLst/>
+                <a:latin typeface="Inconsolata NF Regular" pitchFamily="49" charset="77"/>
+              </a:rPr>
+              <a:t>The Django ORM …</a:t>
+            </a:r>
+            <a:endParaRPr lang="en-US" dirty="0"/>
+          </a:p>
+        </p:txBody>
+      </p:sp>
+    </p:spTree>
+    <p:extLst>
+      <p:ext uri="{BB962C8B-B14F-4D97-AF65-F5344CB8AC3E}">
+        <p14:creationId xmlns:p14="http://schemas.microsoft.com/office/powerpoint/2010/main" val="1445870987"/>
+      </p:ext>
+    </p:extLst>
+  </p:cSld>
+  <p:clrMapOvr>
+    <a:masterClrMapping/>
+  </p:clrMapOvr>
+</p:sld>
+</file>
+
+<file path=ppt/slides/slide28.xml><?xml version="1.0" encoding="utf-8"?>
+<p:sld xmlns:a="http://schemas.openxmlformats.org/drawingml/2006/main" xmlns:r="http://schemas.openxmlformats.org/officeDocument/2006/relationships" xmlns:p="http://schemas.openxmlformats.org/presentationml/2006/main">
+  <p:cSld>
+    <p:spTree>
+      <p:nvGrpSpPr>
+        <p:cNvPr id="1" name=""/>
+        <p:cNvGrpSpPr/>
+        <p:nvPr/>
+      </p:nvGrpSpPr>
+      <p:grpSpPr>
+        <a:xfrm>
+          <a:off x="0" y="0"/>
+          <a:ext cx="0" cy="0"/>
+          <a:chOff x="0" y="0"/>
+          <a:chExt cx="0" cy="0"/>
+        </a:xfrm>
+      </p:grpSpPr>
+      <p:sp>
+        <p:nvSpPr>
+          <p:cNvPr id="4" name="Title 3">
+            <a:extLst>
+              <a:ext uri="{FF2B5EF4-FFF2-40B4-BE49-F238E27FC236}">
+                <a16:creationId xmlns:a16="http://schemas.microsoft.com/office/drawing/2014/main" id="{4EC330F1-2E50-8B47-1D7A-DC1887E3FA13}"/>
+              </a:ext>
+            </a:extLst>
+          </p:cNvPr>
+          <p:cNvSpPr>
+            <a:spLocks noGrp="1"/>
+          </p:cNvSpPr>
+          <p:nvPr>
+            <p:ph type="title"/>
+          </p:nvPr>
+        </p:nvSpPr>
+        <p:spPr>
+          <a:xfrm>
+            <a:off x="838200" y="2621629"/>
+            <a:ext cx="10515600" cy="1325563"/>
+          </a:xfrm>
+        </p:spPr>
+        <p:txBody>
+          <a:bodyPr/>
+          <a:lstStyle/>
+          <a:p>
+            <a:pPr algn="ctr"/>
+            <a:r>
+              <a:rPr lang="en-US" b="1" dirty="0">
+                <a:solidFill>
+                  <a:srgbClr val="569CD6"/>
+                </a:solidFill>
+                <a:effectLst/>
+                <a:latin typeface="Inconsolata NF Regular" pitchFamily="49" charset="77"/>
+              </a:rPr>
+              <a:t>It’s **just** Python</a:t>
+            </a:r>
+            <a:endParaRPr lang="en-US" dirty="0"/>
+          </a:p>
+        </p:txBody>
+      </p:sp>
+    </p:spTree>
+    <p:extLst>
+      <p:ext uri="{BB962C8B-B14F-4D97-AF65-F5344CB8AC3E}">
+        <p14:creationId xmlns:p14="http://schemas.microsoft.com/office/powerpoint/2010/main" val="3048434044"/>
+      </p:ext>
+    </p:extLst>
+  </p:cSld>
+  <p:clrMapOvr>
+    <a:masterClrMapping/>
+  </p:clrMapOvr>
+</p:sld>
+</file>
+
+<file path=ppt/slides/slide29.xml><?xml version="1.0" encoding="utf-8"?>
+<p:sld xmlns:a="http://schemas.openxmlformats.org/drawingml/2006/main" xmlns:r="http://schemas.openxmlformats.org/officeDocument/2006/relationships" xmlns:p="http://schemas.openxmlformats.org/presentationml/2006/main">
+  <p:cSld>
+    <p:spTree>
+      <p:nvGrpSpPr>
+        <p:cNvPr id="1" name=""/>
+        <p:cNvGrpSpPr/>
+        <p:nvPr/>
+      </p:nvGrpSpPr>
+      <p:grpSpPr>
+        <a:xfrm>
+          <a:off x="0" y="0"/>
+          <a:ext cx="0" cy="0"/>
+          <a:chOff x="0" y="0"/>
+          <a:chExt cx="0" cy="0"/>
+        </a:xfrm>
+      </p:grpSpPr>
+      <p:sp>
+        <p:nvSpPr>
+          <p:cNvPr id="4" name="Title 3">
+            <a:extLst>
+              <a:ext uri="{FF2B5EF4-FFF2-40B4-BE49-F238E27FC236}">
+                <a16:creationId xmlns:a16="http://schemas.microsoft.com/office/drawing/2014/main" id="{4EC330F1-2E50-8B47-1D7A-DC1887E3FA13}"/>
+              </a:ext>
+            </a:extLst>
+          </p:cNvPr>
+          <p:cNvSpPr>
+            <a:spLocks noGrp="1"/>
+          </p:cNvSpPr>
+          <p:nvPr>
+            <p:ph type="title"/>
+          </p:nvPr>
+        </p:nvSpPr>
+        <p:spPr>
+          <a:xfrm>
+            <a:off x="838200" y="2621629"/>
+            <a:ext cx="10515600" cy="1325563"/>
+          </a:xfrm>
+        </p:spPr>
+        <p:txBody>
+          <a:bodyPr/>
+          <a:lstStyle/>
+          <a:p>
+            <a:pPr algn="ctr"/>
+            <a:r>
+              <a:rPr lang="en-US" b="1" dirty="0">
+                <a:solidFill>
+                  <a:srgbClr val="569CD6"/>
+                </a:solidFill>
+                <a:effectLst/>
+                <a:latin typeface="Inconsolata NF Regular" pitchFamily="49" charset="77"/>
+              </a:rPr>
+              <a:t>In fact, all of Django … </a:t>
+            </a:r>
+            <a:endParaRPr lang="en-US" dirty="0"/>
+          </a:p>
+        </p:txBody>
+      </p:sp>
+    </p:spTree>
+    <p:extLst>
+      <p:ext uri="{BB962C8B-B14F-4D97-AF65-F5344CB8AC3E}">
+        <p14:creationId xmlns:p14="http://schemas.microsoft.com/office/powerpoint/2010/main" val="1090607113"/>
       </p:ext>
     </p:extLst>
   </p:cSld>
@@ -5314,6 +9300,310 @@
     <p:extLst>
       <p:ext uri="{BB962C8B-B14F-4D97-AF65-F5344CB8AC3E}">
         <p14:creationId xmlns:p14="http://schemas.microsoft.com/office/powerpoint/2010/main" val="1293500838"/>
+      </p:ext>
+    </p:extLst>
+  </p:cSld>
+  <p:clrMapOvr>
+    <a:masterClrMapping/>
+  </p:clrMapOvr>
+</p:sld>
+</file>
+
+<file path=ppt/slides/slide30.xml><?xml version="1.0" encoding="utf-8"?>
+<p:sld xmlns:a="http://schemas.openxmlformats.org/drawingml/2006/main" xmlns:r="http://schemas.openxmlformats.org/officeDocument/2006/relationships" xmlns:p="http://schemas.openxmlformats.org/presentationml/2006/main">
+  <p:cSld>
+    <p:spTree>
+      <p:nvGrpSpPr>
+        <p:cNvPr id="1" name=""/>
+        <p:cNvGrpSpPr/>
+        <p:nvPr/>
+      </p:nvGrpSpPr>
+      <p:grpSpPr>
+        <a:xfrm>
+          <a:off x="0" y="0"/>
+          <a:ext cx="0" cy="0"/>
+          <a:chOff x="0" y="0"/>
+          <a:chExt cx="0" cy="0"/>
+        </a:xfrm>
+      </p:grpSpPr>
+      <p:sp>
+        <p:nvSpPr>
+          <p:cNvPr id="4" name="Title 3">
+            <a:extLst>
+              <a:ext uri="{FF2B5EF4-FFF2-40B4-BE49-F238E27FC236}">
+                <a16:creationId xmlns:a16="http://schemas.microsoft.com/office/drawing/2014/main" id="{4EC330F1-2E50-8B47-1D7A-DC1887E3FA13}"/>
+              </a:ext>
+            </a:extLst>
+          </p:cNvPr>
+          <p:cNvSpPr>
+            <a:spLocks noGrp="1"/>
+          </p:cNvSpPr>
+          <p:nvPr>
+            <p:ph type="title"/>
+          </p:nvPr>
+        </p:nvSpPr>
+        <p:spPr>
+          <a:xfrm>
+            <a:off x="838200" y="2621629"/>
+            <a:ext cx="10515600" cy="1325563"/>
+          </a:xfrm>
+        </p:spPr>
+        <p:txBody>
+          <a:bodyPr/>
+          <a:lstStyle/>
+          <a:p>
+            <a:pPr algn="ctr"/>
+            <a:r>
+              <a:rPr lang="en-US" b="1" dirty="0">
+                <a:solidFill>
+                  <a:srgbClr val="569CD6"/>
+                </a:solidFill>
+                <a:effectLst/>
+                <a:latin typeface="Inconsolata NF Regular" pitchFamily="49" charset="77"/>
+              </a:rPr>
+              <a:t>It’s **just** Python</a:t>
+            </a:r>
+            <a:endParaRPr lang="en-US" dirty="0"/>
+          </a:p>
+        </p:txBody>
+      </p:sp>
+    </p:spTree>
+    <p:extLst>
+      <p:ext uri="{BB962C8B-B14F-4D97-AF65-F5344CB8AC3E}">
+        <p14:creationId xmlns:p14="http://schemas.microsoft.com/office/powerpoint/2010/main" val="273239564"/>
+      </p:ext>
+    </p:extLst>
+  </p:cSld>
+  <p:clrMapOvr>
+    <a:masterClrMapping/>
+  </p:clrMapOvr>
+</p:sld>
+</file>
+
+<file path=ppt/slides/slide31.xml><?xml version="1.0" encoding="utf-8"?>
+<p:sld xmlns:a="http://schemas.openxmlformats.org/drawingml/2006/main" xmlns:r="http://schemas.openxmlformats.org/officeDocument/2006/relationships" xmlns:p="http://schemas.openxmlformats.org/presentationml/2006/main">
+  <p:cSld>
+    <p:spTree>
+      <p:nvGrpSpPr>
+        <p:cNvPr id="1" name=""/>
+        <p:cNvGrpSpPr/>
+        <p:nvPr/>
+      </p:nvGrpSpPr>
+      <p:grpSpPr>
+        <a:xfrm>
+          <a:off x="0" y="0"/>
+          <a:ext cx="0" cy="0"/>
+          <a:chOff x="0" y="0"/>
+          <a:chExt cx="0" cy="0"/>
+        </a:xfrm>
+      </p:grpSpPr>
+      <p:sp>
+        <p:nvSpPr>
+          <p:cNvPr id="4" name="Title 3">
+            <a:extLst>
+              <a:ext uri="{FF2B5EF4-FFF2-40B4-BE49-F238E27FC236}">
+                <a16:creationId xmlns:a16="http://schemas.microsoft.com/office/drawing/2014/main" id="{4EC330F1-2E50-8B47-1D7A-DC1887E3FA13}"/>
+              </a:ext>
+            </a:extLst>
+          </p:cNvPr>
+          <p:cNvSpPr>
+            <a:spLocks noGrp="1"/>
+          </p:cNvSpPr>
+          <p:nvPr>
+            <p:ph type="title"/>
+          </p:nvPr>
+        </p:nvSpPr>
+        <p:spPr>
+          <a:xfrm>
+            <a:off x="838200" y="2621629"/>
+            <a:ext cx="10515600" cy="1325563"/>
+          </a:xfrm>
+        </p:spPr>
+        <p:txBody>
+          <a:bodyPr/>
+          <a:lstStyle/>
+          <a:p>
+            <a:pPr algn="ctr"/>
+            <a:r>
+              <a:rPr lang="en-US" b="1" dirty="0">
+                <a:solidFill>
+                  <a:srgbClr val="569CD6"/>
+                </a:solidFill>
+                <a:effectLst/>
+                <a:latin typeface="Inconsolata NF Regular" pitchFamily="49" charset="77"/>
+              </a:rPr>
+              <a:t>Looking at Tickets</a:t>
+            </a:r>
+            <a:endParaRPr lang="en-US" dirty="0"/>
+          </a:p>
+        </p:txBody>
+      </p:sp>
+    </p:spTree>
+    <p:extLst>
+      <p:ext uri="{BB962C8B-B14F-4D97-AF65-F5344CB8AC3E}">
+        <p14:creationId xmlns:p14="http://schemas.microsoft.com/office/powerpoint/2010/main" val="1766153423"/>
+      </p:ext>
+    </p:extLst>
+  </p:cSld>
+  <p:clrMapOvr>
+    <a:masterClrMapping/>
+  </p:clrMapOvr>
+</p:sld>
+</file>
+
+<file path=ppt/slides/slide32.xml><?xml version="1.0" encoding="utf-8"?>
+<p:sld xmlns:a="http://schemas.openxmlformats.org/drawingml/2006/main" xmlns:r="http://schemas.openxmlformats.org/officeDocument/2006/relationships" xmlns:p="http://schemas.openxmlformats.org/presentationml/2006/main">
+  <p:cSld>
+    <p:spTree>
+      <p:nvGrpSpPr>
+        <p:cNvPr id="1" name=""/>
+        <p:cNvGrpSpPr/>
+        <p:nvPr/>
+      </p:nvGrpSpPr>
+      <p:grpSpPr>
+        <a:xfrm>
+          <a:off x="0" y="0"/>
+          <a:ext cx="0" cy="0"/>
+          <a:chOff x="0" y="0"/>
+          <a:chExt cx="0" cy="0"/>
+        </a:xfrm>
+      </p:grpSpPr>
+      <p:sp>
+        <p:nvSpPr>
+          <p:cNvPr id="4" name="Title 3">
+            <a:extLst>
+              <a:ext uri="{FF2B5EF4-FFF2-40B4-BE49-F238E27FC236}">
+                <a16:creationId xmlns:a16="http://schemas.microsoft.com/office/drawing/2014/main" id="{4EC330F1-2E50-8B47-1D7A-DC1887E3FA13}"/>
+              </a:ext>
+            </a:extLst>
+          </p:cNvPr>
+          <p:cNvSpPr>
+            <a:spLocks noGrp="1"/>
+          </p:cNvSpPr>
+          <p:nvPr>
+            <p:ph type="title"/>
+          </p:nvPr>
+        </p:nvSpPr>
+        <p:spPr>
+          <a:xfrm>
+            <a:off x="838200" y="2621629"/>
+            <a:ext cx="10515600" cy="1325563"/>
+          </a:xfrm>
+        </p:spPr>
+        <p:txBody>
+          <a:bodyPr/>
+          <a:lstStyle/>
+          <a:p>
+            <a:pPr algn="ctr"/>
+            <a:r>
+              <a:rPr lang="en-US" b="1" dirty="0">
+                <a:solidFill>
+                  <a:srgbClr val="569CD6"/>
+                </a:solidFill>
+                <a:effectLst/>
+                <a:latin typeface="Inconsolata NF Regular" pitchFamily="49" charset="77"/>
+              </a:rPr>
+              <a:t>It’s **just** Python</a:t>
+            </a:r>
+            <a:endParaRPr lang="en-US" dirty="0"/>
+          </a:p>
+        </p:txBody>
+      </p:sp>
+    </p:spTree>
+    <p:extLst>
+      <p:ext uri="{BB962C8B-B14F-4D97-AF65-F5344CB8AC3E}">
+        <p14:creationId xmlns:p14="http://schemas.microsoft.com/office/powerpoint/2010/main" val="3967692305"/>
+      </p:ext>
+    </p:extLst>
+  </p:cSld>
+  <p:clrMapOvr>
+    <a:masterClrMapping/>
+  </p:clrMapOvr>
+</p:sld>
+</file>
+
+<file path=ppt/slides/slide33.xml><?xml version="1.0" encoding="utf-8"?>
+<p:sld xmlns:a="http://schemas.openxmlformats.org/drawingml/2006/main" xmlns:r="http://schemas.openxmlformats.org/officeDocument/2006/relationships" xmlns:p="http://schemas.openxmlformats.org/presentationml/2006/main">
+  <p:cSld>
+    <p:spTree>
+      <p:nvGrpSpPr>
+        <p:cNvPr id="1" name=""/>
+        <p:cNvGrpSpPr/>
+        <p:nvPr/>
+      </p:nvGrpSpPr>
+      <p:grpSpPr>
+        <a:xfrm>
+          <a:off x="0" y="0"/>
+          <a:ext cx="0" cy="0"/>
+          <a:chOff x="0" y="0"/>
+          <a:chExt cx="0" cy="0"/>
+        </a:xfrm>
+      </p:grpSpPr>
+      <p:sp>
+        <p:nvSpPr>
+          <p:cNvPr id="4" name="Title 3">
+            <a:extLst>
+              <a:ext uri="{FF2B5EF4-FFF2-40B4-BE49-F238E27FC236}">
+                <a16:creationId xmlns:a16="http://schemas.microsoft.com/office/drawing/2014/main" id="{4EC330F1-2E50-8B47-1D7A-DC1887E3FA13}"/>
+              </a:ext>
+            </a:extLst>
+          </p:cNvPr>
+          <p:cNvSpPr>
+            <a:spLocks noGrp="1"/>
+          </p:cNvSpPr>
+          <p:nvPr>
+            <p:ph type="title"/>
+          </p:nvPr>
+        </p:nvSpPr>
+        <p:spPr>
+          <a:xfrm>
+            <a:off x="838200" y="2621629"/>
+            <a:ext cx="10515600" cy="1325563"/>
+          </a:xfrm>
+        </p:spPr>
+        <p:txBody>
+          <a:bodyPr/>
+          <a:lstStyle/>
+          <a:p>
+            <a:pPr algn="ctr"/>
+            <a:endParaRPr lang="en-US" dirty="0"/>
+          </a:p>
+        </p:txBody>
+      </p:sp>
+      <p:pic>
+        <p:nvPicPr>
+          <p:cNvPr id="2" name="Picture 1">
+            <a:extLst>
+              <a:ext uri="{FF2B5EF4-FFF2-40B4-BE49-F238E27FC236}">
+                <a16:creationId xmlns:a16="http://schemas.microsoft.com/office/drawing/2014/main" id="{1971D723-449D-10FD-5EAE-B82B5446F26C}"/>
+              </a:ext>
+            </a:extLst>
+          </p:cNvPr>
+          <p:cNvPicPr>
+            <a:picLocks noChangeAspect="1"/>
+          </p:cNvPicPr>
+          <p:nvPr/>
+        </p:nvPicPr>
+        <p:blipFill>
+          <a:blip r:embed="rId3"/>
+          <a:stretch>
+            <a:fillRect/>
+          </a:stretch>
+        </p:blipFill>
+        <p:spPr>
+          <a:xfrm>
+            <a:off x="838200" y="1136086"/>
+            <a:ext cx="10857044" cy="4585827"/>
+          </a:xfrm>
+          <a:prstGeom prst="rect">
+            <a:avLst/>
+          </a:prstGeom>
+        </p:spPr>
+      </p:pic>
+    </p:spTree>
+    <p:extLst>
+      <p:ext uri="{BB962C8B-B14F-4D97-AF65-F5344CB8AC3E}">
+        <p14:creationId xmlns:p14="http://schemas.microsoft.com/office/powerpoint/2010/main" val="2340535651"/>
       </p:ext>
     </p:extLst>
   </p:cSld>

</xml_diff>